<commit_message>
Lecture updates; new HW
</commit_message>
<xml_diff>
--- a/Lectures/Verification-and-Validation/vav_overview.pptx
+++ b/Lectures/Verification-and-Validation/vav_overview.pptx
@@ -288,7 +288,7 @@
       </p15:sldGuideLst>
     </p:ext>
     <p:ext uri="http://customooxmlschemas.google.com/">
-      <go:slidesCustomData xmlns:go="http://customooxmlschemas.google.com/" xmlns:ahyp="http://schemas.microsoft.com/office/drawing/2018/hyperlinkcolor" xmlns:p15="http://schemas.microsoft.com/office/powerpoint/2012/main" xmlns:p14="http://schemas.microsoft.com/office/powerpoint/2010/main" xmlns:com="http://schemas.openxmlformats.org/drawingml/2006/compatibility" xmlns:pvml="urn:schemas-microsoft-com:office:powerpoint" xmlns:v="urn:schemas-microsoft-com:vml" xmlns:o="urn:schemas-microsoft-com:office:office" xmlns:dgm="http://schemas.openxmlformats.org/drawingml/2006/diagram" xmlns:c="http://schemas.openxmlformats.org/drawingml/2006/chart" xmlns:mv="urn:schemas-microsoft-com:mac:vml" xmlns:mc="http://schemas.openxmlformats.org/markup-compatibility/2006" xmlns="" r:id="rId33" roundtripDataSignature="AMtx7mgGxSr5a7o+vNLoFmls+x7964BgeQ=="/>
+      <go:slidesCustomData xmlns="" xmlns:mc="http://schemas.openxmlformats.org/markup-compatibility/2006" xmlns:mv="urn:schemas-microsoft-com:mac:vml" xmlns:c="http://schemas.openxmlformats.org/drawingml/2006/chart" xmlns:dgm="http://schemas.openxmlformats.org/drawingml/2006/diagram" xmlns:o="urn:schemas-microsoft-com:office:office" xmlns:v="urn:schemas-microsoft-com:vml" xmlns:pvml="urn:schemas-microsoft-com:office:powerpoint" xmlns:com="http://schemas.openxmlformats.org/drawingml/2006/compatibility" xmlns:p14="http://schemas.microsoft.com/office/powerpoint/2010/main" xmlns:p15="http://schemas.microsoft.com/office/powerpoint/2012/main" xmlns:ahyp="http://schemas.microsoft.com/office/drawing/2018/hyperlinkcolor" xmlns:go="http://customooxmlschemas.google.com/" r:id="rId33" roundtripDataSignature="AMtx7mgGxSr5a7o+vNLoFmls+x7964BgeQ=="/>
     </p:ext>
   </p:extLst>
 </p:presentation>
@@ -32121,8 +32121,8 @@
         </p:nvSpPr>
         <p:spPr>
           <a:xfrm>
-            <a:off x="4932550" y="1204925"/>
-            <a:ext cx="2527500" cy="602100"/>
+            <a:off x="4479721" y="1204925"/>
+            <a:ext cx="2980329" cy="602100"/>
           </a:xfrm>
           <a:prstGeom prst="ellipse">
             <a:avLst/>
@@ -32177,7 +32177,7 @@
               <a:buNone/>
             </a:pPr>
             <a:r>
-              <a:rPr lang="en-US" sz="1600" b="0" i="0" u="none" strike="noStrike" cap="none">
+              <a:rPr lang="en-US" sz="1600" b="0" i="0" u="none" strike="noStrike" cap="none" dirty="0">
                 <a:solidFill>
                   <a:schemeClr val="lt1"/>
                 </a:solidFill>
@@ -32186,9 +32186,9 @@
                 <a:cs typeface="Arial"/>
                 <a:sym typeface="Arial"/>
               </a:rPr>
-              <a:t>C86=c154=c160</a:t>
+              <a:t>C6=C86=c154=c160</a:t>
             </a:r>
-            <a:endParaRPr sz="1400" b="0" i="0" u="none" strike="noStrike" cap="none">
+            <a:endParaRPr sz="1400" b="0" i="0" u="none" strike="noStrike" cap="none" dirty="0">
               <a:solidFill>
                 <a:srgbClr val="000000"/>
               </a:solidFill>
@@ -32208,8 +32208,8 @@
         </p:nvSpPr>
         <p:spPr>
           <a:xfrm>
-            <a:off x="7460008" y="1321314"/>
-            <a:ext cx="1313100" cy="369300"/>
+            <a:off x="6560191" y="1760499"/>
+            <a:ext cx="2155970" cy="369291"/>
           </a:xfrm>
           <a:prstGeom prst="rect">
             <a:avLst/>
@@ -32243,7 +32243,7 @@
               <a:buNone/>
             </a:pPr>
             <a:r>
-              <a:rPr lang="en-US" sz="1800" b="0" i="0" u="none" strike="noStrike" cap="none">
+              <a:rPr lang="en-US" sz="1800" b="0" i="0" u="none" strike="noStrike" cap="none" dirty="0">
                 <a:solidFill>
                   <a:schemeClr val="dk1"/>
                 </a:solidFill>
@@ -32252,9 +32252,9 @@
                 <a:cs typeface="Arial"/>
                 <a:sym typeface="Arial"/>
               </a:rPr>
-              <a:t>v537, v601</a:t>
+              <a:t>v537, v601, v503</a:t>
             </a:r>
-            <a:endParaRPr sz="1400" b="0" i="0" u="none" strike="noStrike" cap="none">
+            <a:endParaRPr sz="1400" b="0" i="0" u="none" strike="noStrike" cap="none" dirty="0">
               <a:solidFill>
                 <a:srgbClr val="000000"/>
               </a:solidFill>
@@ -32270,20 +32270,21 @@
         <p:nvCxnSpPr>
           <p:cNvPr id="395" name="Google Shape;395;p22"/>
           <p:cNvCxnSpPr>
+            <a:cxnSpLocks/>
             <a:stCxn id="393" idx="2"/>
             <a:endCxn id="393" idx="4"/>
           </p:cNvCxnSpPr>
           <p:nvPr/>
         </p:nvCxnSpPr>
         <p:spPr>
-          <a:xfrm>
-            <a:off x="4932550" y="1505975"/>
-            <a:ext cx="1263900" cy="301200"/>
+          <a:xfrm rot="10800000" flipH="1" flipV="1">
+            <a:off x="4479720" y="1505975"/>
+            <a:ext cx="1490165" cy="301050"/>
           </a:xfrm>
           <a:prstGeom prst="bentConnector4">
             <a:avLst>
-              <a:gd name="adj1" fmla="val -18840"/>
-              <a:gd name="adj2" fmla="val 179009"/>
+              <a:gd name="adj1" fmla="val -15341"/>
+              <a:gd name="adj2" fmla="val 175934"/>
             </a:avLst>
           </a:prstGeom>
           <a:noFill/>

</xml_diff>

<commit_message>
Beginning lecture on dimension reduction.
</commit_message>
<xml_diff>
--- a/Lectures/Verification-and-Validation/vav_overview.pptx
+++ b/Lectures/Verification-and-Validation/vav_overview.pptx
@@ -10,37 +10,34 @@
   <p:sldIdLst>
     <p:sldId id="473" r:id="rId2"/>
     <p:sldId id="257" r:id="rId3"/>
-    <p:sldId id="258" r:id="rId4"/>
-    <p:sldId id="259" r:id="rId5"/>
-    <p:sldId id="260" r:id="rId6"/>
-    <p:sldId id="261" r:id="rId7"/>
-    <p:sldId id="262" r:id="rId8"/>
-    <p:sldId id="264" r:id="rId9"/>
-    <p:sldId id="265" r:id="rId10"/>
-    <p:sldId id="266" r:id="rId11"/>
-    <p:sldId id="267" r:id="rId12"/>
-    <p:sldId id="268" r:id="rId13"/>
-    <p:sldId id="269" r:id="rId14"/>
-    <p:sldId id="270" r:id="rId15"/>
-    <p:sldId id="271" r:id="rId16"/>
-    <p:sldId id="272" r:id="rId17"/>
-    <p:sldId id="273" r:id="rId18"/>
-    <p:sldId id="274" r:id="rId19"/>
-    <p:sldId id="275" r:id="rId20"/>
-    <p:sldId id="276" r:id="rId21"/>
-    <p:sldId id="277" r:id="rId22"/>
-    <p:sldId id="278" r:id="rId23"/>
-    <p:sldId id="279" r:id="rId24"/>
+    <p:sldId id="259" r:id="rId4"/>
+    <p:sldId id="260" r:id="rId5"/>
+    <p:sldId id="261" r:id="rId6"/>
+    <p:sldId id="262" r:id="rId7"/>
+    <p:sldId id="264" r:id="rId8"/>
+    <p:sldId id="265" r:id="rId9"/>
+    <p:sldId id="266" r:id="rId10"/>
+    <p:sldId id="267" r:id="rId11"/>
+    <p:sldId id="268" r:id="rId12"/>
+    <p:sldId id="269" r:id="rId13"/>
+    <p:sldId id="270" r:id="rId14"/>
+    <p:sldId id="271" r:id="rId15"/>
+    <p:sldId id="272" r:id="rId16"/>
+    <p:sldId id="273" r:id="rId17"/>
+    <p:sldId id="274" r:id="rId18"/>
+    <p:sldId id="275" r:id="rId19"/>
+    <p:sldId id="276" r:id="rId20"/>
+    <p:sldId id="277" r:id="rId21"/>
+    <p:sldId id="278" r:id="rId22"/>
+    <p:sldId id="279" r:id="rId23"/>
+    <p:sldId id="474" r:id="rId24"/>
   </p:sldIdLst>
   <p:sldSz cx="9144000" cy="6858000" type="screen4x3"/>
   <p:notesSz cx="6858000" cy="9144000"/>
   <p:embeddedFontLst>
     <p:embeddedFont>
-      <p:font typeface="Calibri" panose="020F0502020204030204" pitchFamily="34" charset="0"/>
+      <p:font typeface="ＭＳ Ｐゴシック" panose="020B0600070205080204" pitchFamily="34" charset="-128"/>
       <p:regular r:id="rId26"/>
-      <p:bold r:id="rId27"/>
-      <p:italic r:id="rId28"/>
-      <p:boldItalic r:id="rId29"/>
     </p:embeddedFont>
   </p:embeddedFontLst>
   <p:defaultTextStyle>
@@ -288,7 +285,7 @@
       </p15:sldGuideLst>
     </p:ext>
     <p:ext uri="http://customooxmlschemas.google.com/">
-      <go:slidesCustomData xmlns="" xmlns:mc="http://schemas.openxmlformats.org/markup-compatibility/2006" xmlns:mv="urn:schemas-microsoft-com:mac:vml" xmlns:c="http://schemas.openxmlformats.org/drawingml/2006/chart" xmlns:dgm="http://schemas.openxmlformats.org/drawingml/2006/diagram" xmlns:o="urn:schemas-microsoft-com:office:office" xmlns:v="urn:schemas-microsoft-com:vml" xmlns:pvml="urn:schemas-microsoft-com:office:powerpoint" xmlns:com="http://schemas.openxmlformats.org/drawingml/2006/compatibility" xmlns:p14="http://schemas.microsoft.com/office/powerpoint/2010/main" xmlns:p15="http://schemas.microsoft.com/office/powerpoint/2012/main" xmlns:ahyp="http://schemas.microsoft.com/office/drawing/2018/hyperlinkcolor" xmlns:go="http://customooxmlschemas.google.com/" r:id="rId33" roundtripDataSignature="AMtx7mgGxSr5a7o+vNLoFmls+x7964BgeQ=="/>
+      <go:slidesCustomData xmlns:go="http://customooxmlschemas.google.com/" xmlns:ahyp="http://schemas.microsoft.com/office/drawing/2018/hyperlinkcolor" xmlns:p15="http://schemas.microsoft.com/office/powerpoint/2012/main" xmlns:p14="http://schemas.microsoft.com/office/powerpoint/2010/main" xmlns:com="http://schemas.openxmlformats.org/drawingml/2006/compatibility" xmlns:pvml="urn:schemas-microsoft-com:office:powerpoint" xmlns:v="urn:schemas-microsoft-com:vml" xmlns:o="urn:schemas-microsoft-com:office:office" xmlns:dgm="http://schemas.openxmlformats.org/drawingml/2006/diagram" xmlns:c="http://schemas.openxmlformats.org/drawingml/2006/chart" xmlns:mv="urn:schemas-microsoft-com:mac:vml" xmlns:mc="http://schemas.openxmlformats.org/markup-compatibility/2006" xmlns="" r:id="rId33" roundtripDataSignature="AMtx7mgGxSr5a7o+vNLoFmls+x7964BgeQ=="/>
     </p:ext>
   </p:extLst>
 </p:presentation>
@@ -1845,128 +1842,6 @@
   <p:cSld>
     <p:spTree>
       <p:nvGrpSpPr>
-        <p:cNvPr id="1" name="Shape 219"/>
-        <p:cNvGrpSpPr/>
-        <p:nvPr/>
-      </p:nvGrpSpPr>
-      <p:grpSpPr>
-        <a:xfrm>
-          <a:off x="0" y="0"/>
-          <a:ext cx="0" cy="0"/>
-          <a:chOff x="0" y="0"/>
-          <a:chExt cx="0" cy="0"/>
-        </a:xfrm>
-      </p:grpSpPr>
-      <p:sp>
-        <p:nvSpPr>
-          <p:cNvPr id="220" name="Google Shape;220;p11:notes"/>
-          <p:cNvSpPr txBox="1">
-            <a:spLocks noGrp="1"/>
-          </p:cNvSpPr>
-          <p:nvPr>
-            <p:ph type="body" idx="1"/>
-          </p:nvPr>
-        </p:nvSpPr>
-        <p:spPr>
-          <a:xfrm>
-            <a:off x="685800" y="4343400"/>
-            <a:ext cx="5486400" cy="4114800"/>
-          </a:xfrm>
-          <a:prstGeom prst="rect">
-            <a:avLst/>
-          </a:prstGeom>
-          <a:noFill/>
-          <a:ln>
-            <a:noFill/>
-          </a:ln>
-        </p:spPr>
-        <p:txBody>
-          <a:bodyPr spcFirstLastPara="1" wrap="square" lIns="91425" tIns="45700" rIns="91425" bIns="45700" anchor="t" anchorCtr="0">
-            <a:noAutofit/>
-          </a:bodyPr>
-          <a:lstStyle/>
-          <a:p>
-            <a:pPr marL="0" lvl="0" indent="0" algn="l" rtl="0">
-              <a:lnSpc>
-                <a:spcPct val="100000"/>
-              </a:lnSpc>
-              <a:spcBef>
-                <a:spcPts val="360"/>
-              </a:spcBef>
-              <a:spcAft>
-                <a:spcPts val="0"/>
-              </a:spcAft>
-              <a:buSzPts val="1400"/>
-              <a:buNone/>
-            </a:pPr>
-            <a:endParaRPr/>
-          </a:p>
-        </p:txBody>
-      </p:sp>
-      <p:sp>
-        <p:nvSpPr>
-          <p:cNvPr id="221" name="Google Shape;221;p11:notes"/>
-          <p:cNvSpPr>
-            <a:spLocks noGrp="1" noRot="1" noChangeAspect="1"/>
-          </p:cNvSpPr>
-          <p:nvPr>
-            <p:ph type="sldImg" idx="2"/>
-          </p:nvPr>
-        </p:nvSpPr>
-        <p:spPr>
-          <a:xfrm>
-            <a:off x="1143000" y="685800"/>
-            <a:ext cx="4572000" cy="3429000"/>
-          </a:xfrm>
-          <a:custGeom>
-            <a:avLst/>
-            <a:gdLst/>
-            <a:ahLst/>
-            <a:cxnLst/>
-            <a:rect l="l" t="t" r="r" b="b"/>
-            <a:pathLst>
-              <a:path w="120000" h="120000" extrusionOk="0">
-                <a:moveTo>
-                  <a:pt x="0" y="0"/>
-                </a:moveTo>
-                <a:lnTo>
-                  <a:pt x="120000" y="0"/>
-                </a:lnTo>
-                <a:lnTo>
-                  <a:pt x="120000" y="120000"/>
-                </a:lnTo>
-                <a:lnTo>
-                  <a:pt x="0" y="120000"/>
-                </a:lnTo>
-                <a:close/>
-              </a:path>
-            </a:pathLst>
-          </a:custGeom>
-          <a:noFill/>
-          <a:ln w="12700" cap="flat" cmpd="sng">
-            <a:solidFill>
-              <a:srgbClr val="000000"/>
-            </a:solidFill>
-            <a:prstDash val="solid"/>
-            <a:round/>
-            <a:headEnd type="none" w="sm" len="sm"/>
-            <a:tailEnd type="none" w="sm" len="sm"/>
-          </a:ln>
-        </p:spPr>
-      </p:sp>
-    </p:spTree>
-  </p:cSld>
-  <p:clrMapOvr>
-    <a:masterClrMapping/>
-  </p:clrMapOvr>
-</p:notes>
-</file>
-
-<file path=ppt/notesSlides/notesSlide11.xml><?xml version="1.0" encoding="utf-8"?>
-<p:notes xmlns:a="http://schemas.openxmlformats.org/drawingml/2006/main" xmlns:r="http://schemas.openxmlformats.org/officeDocument/2006/relationships" xmlns:p="http://schemas.openxmlformats.org/presentationml/2006/main" showMasterSp="0" showMasterPhAnim="0">
-  <p:cSld>
-    <p:spTree>
-      <p:nvGrpSpPr>
         <p:cNvPr id="1" name="Shape 227"/>
         <p:cNvGrpSpPr/>
         <p:nvPr/>
@@ -2084,7 +1959,7 @@
 </p:notes>
 </file>
 
-<file path=ppt/notesSlides/notesSlide12.xml><?xml version="1.0" encoding="utf-8"?>
+<file path=ppt/notesSlides/notesSlide11.xml><?xml version="1.0" encoding="utf-8"?>
 <p:notes xmlns:a="http://schemas.openxmlformats.org/drawingml/2006/main" xmlns:r="http://schemas.openxmlformats.org/officeDocument/2006/relationships" xmlns:p="http://schemas.openxmlformats.org/presentationml/2006/main" showMasterSp="0" showMasterPhAnim="0">
   <p:cSld>
     <p:spTree>
@@ -2206,7 +2081,7 @@
 </p:notes>
 </file>
 
-<file path=ppt/notesSlides/notesSlide13.xml><?xml version="1.0" encoding="utf-8"?>
+<file path=ppt/notesSlides/notesSlide12.xml><?xml version="1.0" encoding="utf-8"?>
 <p:notes xmlns:a="http://schemas.openxmlformats.org/drawingml/2006/main" xmlns:r="http://schemas.openxmlformats.org/officeDocument/2006/relationships" xmlns:p="http://schemas.openxmlformats.org/presentationml/2006/main" showMasterSp="0" showMasterPhAnim="0">
   <p:cSld>
     <p:spTree>
@@ -2328,7 +2203,7 @@
 </p:notes>
 </file>
 
-<file path=ppt/notesSlides/notesSlide14.xml><?xml version="1.0" encoding="utf-8"?>
+<file path=ppt/notesSlides/notesSlide13.xml><?xml version="1.0" encoding="utf-8"?>
 <p:notes xmlns:a="http://schemas.openxmlformats.org/drawingml/2006/main" xmlns:r="http://schemas.openxmlformats.org/officeDocument/2006/relationships" xmlns:p="http://schemas.openxmlformats.org/presentationml/2006/main" showMasterSp="0" showMasterPhAnim="0">
   <p:cSld>
     <p:spTree>
@@ -2450,7 +2325,7 @@
 </p:notes>
 </file>
 
-<file path=ppt/notesSlides/notesSlide15.xml><?xml version="1.0" encoding="utf-8"?>
+<file path=ppt/notesSlides/notesSlide14.xml><?xml version="1.0" encoding="utf-8"?>
 <p:notes xmlns:a="http://schemas.openxmlformats.org/drawingml/2006/main" xmlns:r="http://schemas.openxmlformats.org/officeDocument/2006/relationships" xmlns:p="http://schemas.openxmlformats.org/presentationml/2006/main" showMasterSp="0" showMasterPhAnim="0">
   <p:cSld>
     <p:spTree>
@@ -2572,7 +2447,7 @@
 </p:notes>
 </file>
 
-<file path=ppt/notesSlides/notesSlide16.xml><?xml version="1.0" encoding="utf-8"?>
+<file path=ppt/notesSlides/notesSlide15.xml><?xml version="1.0" encoding="utf-8"?>
 <p:notes xmlns:a="http://schemas.openxmlformats.org/drawingml/2006/main" xmlns:r="http://schemas.openxmlformats.org/officeDocument/2006/relationships" xmlns:p="http://schemas.openxmlformats.org/presentationml/2006/main" showMasterSp="0" showMasterPhAnim="0">
   <p:cSld>
     <p:spTree>
@@ -2694,7 +2569,7 @@
 </p:notes>
 </file>
 
-<file path=ppt/notesSlides/notesSlide17.xml><?xml version="1.0" encoding="utf-8"?>
+<file path=ppt/notesSlides/notesSlide16.xml><?xml version="1.0" encoding="utf-8"?>
 <p:notes xmlns:a="http://schemas.openxmlformats.org/drawingml/2006/main" xmlns:r="http://schemas.openxmlformats.org/officeDocument/2006/relationships" xmlns:p="http://schemas.openxmlformats.org/presentationml/2006/main" showMasterSp="0" showMasterPhAnim="0">
   <p:cSld>
     <p:spTree>
@@ -2856,7 +2731,7 @@
             </a:pPr>
             <a:fld id="{00000000-1234-1234-1234-123412341234}" type="slidenum">
               <a:rPr lang="en-US"/>
-              <a:t>17</a:t>
+              <a:t>16</a:t>
             </a:fld>
             <a:endParaRPr/>
           </a:p>
@@ -2870,7 +2745,7 @@
 </p:notes>
 </file>
 
-<file path=ppt/notesSlides/notesSlide18.xml><?xml version="1.0" encoding="utf-8"?>
+<file path=ppt/notesSlides/notesSlide17.xml><?xml version="1.0" encoding="utf-8"?>
 <p:notes xmlns:a="http://schemas.openxmlformats.org/drawingml/2006/main" xmlns:r="http://schemas.openxmlformats.org/officeDocument/2006/relationships" xmlns:p="http://schemas.openxmlformats.org/presentationml/2006/main" showMasterSp="0" showMasterPhAnim="0">
   <p:cSld>
     <p:spTree>
@@ -2992,7 +2867,7 @@
 </p:notes>
 </file>
 
-<file path=ppt/notesSlides/notesSlide19.xml><?xml version="1.0" encoding="utf-8"?>
+<file path=ppt/notesSlides/notesSlide18.xml><?xml version="1.0" encoding="utf-8"?>
 <p:notes xmlns:a="http://schemas.openxmlformats.org/drawingml/2006/main" xmlns:r="http://schemas.openxmlformats.org/officeDocument/2006/relationships" xmlns:p="http://schemas.openxmlformats.org/presentationml/2006/main" showMasterSp="0" showMasterPhAnim="0">
   <p:cSld>
     <p:spTree>
@@ -3058,6 +2933,128 @@
       <p:sp>
         <p:nvSpPr>
           <p:cNvPr id="364" name="Google Shape;364;p20:notes"/>
+          <p:cNvSpPr>
+            <a:spLocks noGrp="1" noRot="1" noChangeAspect="1"/>
+          </p:cNvSpPr>
+          <p:nvPr>
+            <p:ph type="sldImg" idx="2"/>
+          </p:nvPr>
+        </p:nvSpPr>
+        <p:spPr>
+          <a:xfrm>
+            <a:off x="1143000" y="685800"/>
+            <a:ext cx="4572000" cy="3429000"/>
+          </a:xfrm>
+          <a:custGeom>
+            <a:avLst/>
+            <a:gdLst/>
+            <a:ahLst/>
+            <a:cxnLst/>
+            <a:rect l="l" t="t" r="r" b="b"/>
+            <a:pathLst>
+              <a:path w="120000" h="120000" extrusionOk="0">
+                <a:moveTo>
+                  <a:pt x="0" y="0"/>
+                </a:moveTo>
+                <a:lnTo>
+                  <a:pt x="120000" y="0"/>
+                </a:lnTo>
+                <a:lnTo>
+                  <a:pt x="120000" y="120000"/>
+                </a:lnTo>
+                <a:lnTo>
+                  <a:pt x="0" y="120000"/>
+                </a:lnTo>
+                <a:close/>
+              </a:path>
+            </a:pathLst>
+          </a:custGeom>
+          <a:noFill/>
+          <a:ln w="12700" cap="flat" cmpd="sng">
+            <a:solidFill>
+              <a:srgbClr val="000000"/>
+            </a:solidFill>
+            <a:prstDash val="solid"/>
+            <a:round/>
+            <a:headEnd type="none" w="sm" len="sm"/>
+            <a:tailEnd type="none" w="sm" len="sm"/>
+          </a:ln>
+        </p:spPr>
+      </p:sp>
+    </p:spTree>
+  </p:cSld>
+  <p:clrMapOvr>
+    <a:masterClrMapping/>
+  </p:clrMapOvr>
+</p:notes>
+</file>
+
+<file path=ppt/notesSlides/notesSlide19.xml><?xml version="1.0" encoding="utf-8"?>
+<p:notes xmlns:a="http://schemas.openxmlformats.org/drawingml/2006/main" xmlns:r="http://schemas.openxmlformats.org/officeDocument/2006/relationships" xmlns:p="http://schemas.openxmlformats.org/presentationml/2006/main" showMasterSp="0" showMasterPhAnim="0">
+  <p:cSld>
+    <p:spTree>
+      <p:nvGrpSpPr>
+        <p:cNvPr id="1" name="Shape 371"/>
+        <p:cNvGrpSpPr/>
+        <p:nvPr/>
+      </p:nvGrpSpPr>
+      <p:grpSpPr>
+        <a:xfrm>
+          <a:off x="0" y="0"/>
+          <a:ext cx="0" cy="0"/>
+          <a:chOff x="0" y="0"/>
+          <a:chExt cx="0" cy="0"/>
+        </a:xfrm>
+      </p:grpSpPr>
+      <p:sp>
+        <p:nvSpPr>
+          <p:cNvPr id="372" name="Google Shape;372;p21:notes"/>
+          <p:cNvSpPr txBox="1">
+            <a:spLocks noGrp="1"/>
+          </p:cNvSpPr>
+          <p:nvPr>
+            <p:ph type="body" idx="1"/>
+          </p:nvPr>
+        </p:nvSpPr>
+        <p:spPr>
+          <a:xfrm>
+            <a:off x="685800" y="4343400"/>
+            <a:ext cx="5486400" cy="4114800"/>
+          </a:xfrm>
+          <a:prstGeom prst="rect">
+            <a:avLst/>
+          </a:prstGeom>
+          <a:noFill/>
+          <a:ln>
+            <a:noFill/>
+          </a:ln>
+        </p:spPr>
+        <p:txBody>
+          <a:bodyPr spcFirstLastPara="1" wrap="square" lIns="91425" tIns="45700" rIns="91425" bIns="45700" anchor="t" anchorCtr="0">
+            <a:noAutofit/>
+          </a:bodyPr>
+          <a:lstStyle/>
+          <a:p>
+            <a:pPr marL="0" lvl="0" indent="0" algn="l" rtl="0">
+              <a:lnSpc>
+                <a:spcPct val="100000"/>
+              </a:lnSpc>
+              <a:spcBef>
+                <a:spcPts val="360"/>
+              </a:spcBef>
+              <a:spcAft>
+                <a:spcPts val="0"/>
+              </a:spcAft>
+              <a:buSzPts val="1400"/>
+              <a:buNone/>
+            </a:pPr>
+            <a:endParaRPr/>
+          </a:p>
+        </p:txBody>
+      </p:sp>
+      <p:sp>
+        <p:nvSpPr>
+          <p:cNvPr id="373" name="Google Shape;373;p21:notes"/>
           <p:cNvSpPr>
             <a:spLocks noGrp="1" noRot="1" noChangeAspect="1"/>
           </p:cNvSpPr>
@@ -3241,128 +3238,6 @@
   <p:cSld>
     <p:spTree>
       <p:nvGrpSpPr>
-        <p:cNvPr id="1" name="Shape 371"/>
-        <p:cNvGrpSpPr/>
-        <p:nvPr/>
-      </p:nvGrpSpPr>
-      <p:grpSpPr>
-        <a:xfrm>
-          <a:off x="0" y="0"/>
-          <a:ext cx="0" cy="0"/>
-          <a:chOff x="0" y="0"/>
-          <a:chExt cx="0" cy="0"/>
-        </a:xfrm>
-      </p:grpSpPr>
-      <p:sp>
-        <p:nvSpPr>
-          <p:cNvPr id="372" name="Google Shape;372;p21:notes"/>
-          <p:cNvSpPr txBox="1">
-            <a:spLocks noGrp="1"/>
-          </p:cNvSpPr>
-          <p:nvPr>
-            <p:ph type="body" idx="1"/>
-          </p:nvPr>
-        </p:nvSpPr>
-        <p:spPr>
-          <a:xfrm>
-            <a:off x="685800" y="4343400"/>
-            <a:ext cx="5486400" cy="4114800"/>
-          </a:xfrm>
-          <a:prstGeom prst="rect">
-            <a:avLst/>
-          </a:prstGeom>
-          <a:noFill/>
-          <a:ln>
-            <a:noFill/>
-          </a:ln>
-        </p:spPr>
-        <p:txBody>
-          <a:bodyPr spcFirstLastPara="1" wrap="square" lIns="91425" tIns="45700" rIns="91425" bIns="45700" anchor="t" anchorCtr="0">
-            <a:noAutofit/>
-          </a:bodyPr>
-          <a:lstStyle/>
-          <a:p>
-            <a:pPr marL="0" lvl="0" indent="0" algn="l" rtl="0">
-              <a:lnSpc>
-                <a:spcPct val="100000"/>
-              </a:lnSpc>
-              <a:spcBef>
-                <a:spcPts val="360"/>
-              </a:spcBef>
-              <a:spcAft>
-                <a:spcPts val="0"/>
-              </a:spcAft>
-              <a:buSzPts val="1400"/>
-              <a:buNone/>
-            </a:pPr>
-            <a:endParaRPr/>
-          </a:p>
-        </p:txBody>
-      </p:sp>
-      <p:sp>
-        <p:nvSpPr>
-          <p:cNvPr id="373" name="Google Shape;373;p21:notes"/>
-          <p:cNvSpPr>
-            <a:spLocks noGrp="1" noRot="1" noChangeAspect="1"/>
-          </p:cNvSpPr>
-          <p:nvPr>
-            <p:ph type="sldImg" idx="2"/>
-          </p:nvPr>
-        </p:nvSpPr>
-        <p:spPr>
-          <a:xfrm>
-            <a:off x="1143000" y="685800"/>
-            <a:ext cx="4572000" cy="3429000"/>
-          </a:xfrm>
-          <a:custGeom>
-            <a:avLst/>
-            <a:gdLst/>
-            <a:ahLst/>
-            <a:cxnLst/>
-            <a:rect l="l" t="t" r="r" b="b"/>
-            <a:pathLst>
-              <a:path w="120000" h="120000" extrusionOk="0">
-                <a:moveTo>
-                  <a:pt x="0" y="0"/>
-                </a:moveTo>
-                <a:lnTo>
-                  <a:pt x="120000" y="0"/>
-                </a:lnTo>
-                <a:lnTo>
-                  <a:pt x="120000" y="120000"/>
-                </a:lnTo>
-                <a:lnTo>
-                  <a:pt x="0" y="120000"/>
-                </a:lnTo>
-                <a:close/>
-              </a:path>
-            </a:pathLst>
-          </a:custGeom>
-          <a:noFill/>
-          <a:ln w="12700" cap="flat" cmpd="sng">
-            <a:solidFill>
-              <a:srgbClr val="000000"/>
-            </a:solidFill>
-            <a:prstDash val="solid"/>
-            <a:round/>
-            <a:headEnd type="none" w="sm" len="sm"/>
-            <a:tailEnd type="none" w="sm" len="sm"/>
-          </a:ln>
-        </p:spPr>
-      </p:sp>
-    </p:spTree>
-  </p:cSld>
-  <p:clrMapOvr>
-    <a:masterClrMapping/>
-  </p:clrMapOvr>
-</p:notes>
-</file>
-
-<file path=ppt/notesSlides/notesSlide21.xml><?xml version="1.0" encoding="utf-8"?>
-<p:notes xmlns:a="http://schemas.openxmlformats.org/drawingml/2006/main" xmlns:r="http://schemas.openxmlformats.org/officeDocument/2006/relationships" xmlns:p="http://schemas.openxmlformats.org/presentationml/2006/main" showMasterSp="0" showMasterPhAnim="0">
-  <p:cSld>
-    <p:spTree>
-      <p:nvGrpSpPr>
         <p:cNvPr id="1" name="Shape 381"/>
         <p:cNvGrpSpPr/>
         <p:nvPr/>
@@ -3480,7 +3355,7 @@
 </p:notes>
 </file>
 
-<file path=ppt/notesSlides/notesSlide22.xml><?xml version="1.0" encoding="utf-8"?>
+<file path=ppt/notesSlides/notesSlide21.xml><?xml version="1.0" encoding="utf-8"?>
 <p:notes xmlns:a="http://schemas.openxmlformats.org/drawingml/2006/main" xmlns:r="http://schemas.openxmlformats.org/officeDocument/2006/relationships" xmlns:p="http://schemas.openxmlformats.org/presentationml/2006/main" showMasterSp="0" showMasterPhAnim="0">
   <p:cSld>
     <p:spTree>
@@ -3602,7 +3477,7 @@
 </p:notes>
 </file>
 
-<file path=ppt/notesSlides/notesSlide23.xml><?xml version="1.0" encoding="utf-8"?>
+<file path=ppt/notesSlides/notesSlide22.xml><?xml version="1.0" encoding="utf-8"?>
 <p:notes xmlns:a="http://schemas.openxmlformats.org/drawingml/2006/main" xmlns:r="http://schemas.openxmlformats.org/officeDocument/2006/relationships" xmlns:p="http://schemas.openxmlformats.org/presentationml/2006/main" showMasterSp="0" showMasterPhAnim="0">
   <p:cSld>
     <p:spTree>
@@ -3729,128 +3604,6 @@
   <p:cSld>
     <p:spTree>
       <p:nvGrpSpPr>
-        <p:cNvPr id="1" name="Shape 118"/>
-        <p:cNvGrpSpPr/>
-        <p:nvPr/>
-      </p:nvGrpSpPr>
-      <p:grpSpPr>
-        <a:xfrm>
-          <a:off x="0" y="0"/>
-          <a:ext cx="0" cy="0"/>
-          <a:chOff x="0" y="0"/>
-          <a:chExt cx="0" cy="0"/>
-        </a:xfrm>
-      </p:grpSpPr>
-      <p:sp>
-        <p:nvSpPr>
-          <p:cNvPr id="119" name="Google Shape;119;p3:notes"/>
-          <p:cNvSpPr txBox="1">
-            <a:spLocks noGrp="1"/>
-          </p:cNvSpPr>
-          <p:nvPr>
-            <p:ph type="body" idx="1"/>
-          </p:nvPr>
-        </p:nvSpPr>
-        <p:spPr>
-          <a:xfrm>
-            <a:off x="685800" y="4343400"/>
-            <a:ext cx="5486400" cy="4114800"/>
-          </a:xfrm>
-          <a:prstGeom prst="rect">
-            <a:avLst/>
-          </a:prstGeom>
-          <a:noFill/>
-          <a:ln>
-            <a:noFill/>
-          </a:ln>
-        </p:spPr>
-        <p:txBody>
-          <a:bodyPr spcFirstLastPara="1" wrap="square" lIns="91425" tIns="45700" rIns="91425" bIns="45700" anchor="t" anchorCtr="0">
-            <a:noAutofit/>
-          </a:bodyPr>
-          <a:lstStyle/>
-          <a:p>
-            <a:pPr marL="0" lvl="0" indent="0" algn="l" rtl="0">
-              <a:lnSpc>
-                <a:spcPct val="100000"/>
-              </a:lnSpc>
-              <a:spcBef>
-                <a:spcPts val="360"/>
-              </a:spcBef>
-              <a:spcAft>
-                <a:spcPts val="0"/>
-              </a:spcAft>
-              <a:buSzPts val="1400"/>
-              <a:buNone/>
-            </a:pPr>
-            <a:endParaRPr/>
-          </a:p>
-        </p:txBody>
-      </p:sp>
-      <p:sp>
-        <p:nvSpPr>
-          <p:cNvPr id="120" name="Google Shape;120;p3:notes"/>
-          <p:cNvSpPr>
-            <a:spLocks noGrp="1" noRot="1" noChangeAspect="1"/>
-          </p:cNvSpPr>
-          <p:nvPr>
-            <p:ph type="sldImg" idx="2"/>
-          </p:nvPr>
-        </p:nvSpPr>
-        <p:spPr>
-          <a:xfrm>
-            <a:off x="1143000" y="685800"/>
-            <a:ext cx="4572000" cy="3429000"/>
-          </a:xfrm>
-          <a:custGeom>
-            <a:avLst/>
-            <a:gdLst/>
-            <a:ahLst/>
-            <a:cxnLst/>
-            <a:rect l="l" t="t" r="r" b="b"/>
-            <a:pathLst>
-              <a:path w="120000" h="120000" extrusionOk="0">
-                <a:moveTo>
-                  <a:pt x="0" y="0"/>
-                </a:moveTo>
-                <a:lnTo>
-                  <a:pt x="120000" y="0"/>
-                </a:lnTo>
-                <a:lnTo>
-                  <a:pt x="120000" y="120000"/>
-                </a:lnTo>
-                <a:lnTo>
-                  <a:pt x="0" y="120000"/>
-                </a:lnTo>
-                <a:close/>
-              </a:path>
-            </a:pathLst>
-          </a:custGeom>
-          <a:noFill/>
-          <a:ln w="12700" cap="flat" cmpd="sng">
-            <a:solidFill>
-              <a:srgbClr val="000000"/>
-            </a:solidFill>
-            <a:prstDash val="solid"/>
-            <a:round/>
-            <a:headEnd type="none" w="sm" len="sm"/>
-            <a:tailEnd type="none" w="sm" len="sm"/>
-          </a:ln>
-        </p:spPr>
-      </p:sp>
-    </p:spTree>
-  </p:cSld>
-  <p:clrMapOvr>
-    <a:masterClrMapping/>
-  </p:clrMapOvr>
-</p:notes>
-</file>
-
-<file path=ppt/notesSlides/notesSlide4.xml><?xml version="1.0" encoding="utf-8"?>
-<p:notes xmlns:a="http://schemas.openxmlformats.org/drawingml/2006/main" xmlns:r="http://schemas.openxmlformats.org/officeDocument/2006/relationships" xmlns:p="http://schemas.openxmlformats.org/presentationml/2006/main" showMasterSp="0" showMasterPhAnim="0">
-  <p:cSld>
-    <p:spTree>
-      <p:nvGrpSpPr>
         <p:cNvPr id="1" name="Shape 127"/>
         <p:cNvGrpSpPr/>
         <p:nvPr/>
@@ -3968,7 +3721,7 @@
 </p:notes>
 </file>
 
-<file path=ppt/notesSlides/notesSlide5.xml><?xml version="1.0" encoding="utf-8"?>
+<file path=ppt/notesSlides/notesSlide4.xml><?xml version="1.0" encoding="utf-8"?>
 <p:notes xmlns:a="http://schemas.openxmlformats.org/drawingml/2006/main" xmlns:r="http://schemas.openxmlformats.org/officeDocument/2006/relationships" xmlns:p="http://schemas.openxmlformats.org/presentationml/2006/main" showMasterSp="0" showMasterPhAnim="0">
   <p:cSld>
     <p:spTree>
@@ -4126,7 +3879,7 @@
             </a:pPr>
             <a:fld id="{00000000-1234-1234-1234-123412341234}" type="slidenum">
               <a:rPr lang="en-US"/>
-              <a:t>5</a:t>
+              <a:t>4</a:t>
             </a:fld>
             <a:endParaRPr/>
           </a:p>
@@ -4140,7 +3893,7 @@
 </p:notes>
 </file>
 
-<file path=ppt/notesSlides/notesSlide6.xml><?xml version="1.0" encoding="utf-8"?>
+<file path=ppt/notesSlides/notesSlide5.xml><?xml version="1.0" encoding="utf-8"?>
 <p:notes xmlns:a="http://schemas.openxmlformats.org/drawingml/2006/main" xmlns:r="http://schemas.openxmlformats.org/officeDocument/2006/relationships" xmlns:p="http://schemas.openxmlformats.org/presentationml/2006/main" showMasterSp="0" showMasterPhAnim="0">
   <p:cSld>
     <p:spTree>
@@ -4262,7 +4015,7 @@
 </p:notes>
 </file>
 
-<file path=ppt/notesSlides/notesSlide7.xml><?xml version="1.0" encoding="utf-8"?>
+<file path=ppt/notesSlides/notesSlide6.xml><?xml version="1.0" encoding="utf-8"?>
 <p:notes xmlns:a="http://schemas.openxmlformats.org/drawingml/2006/main" xmlns:r="http://schemas.openxmlformats.org/officeDocument/2006/relationships" xmlns:p="http://schemas.openxmlformats.org/presentationml/2006/main" showMasterSp="0" showMasterPhAnim="0">
   <p:cSld>
     <p:spTree>
@@ -4384,7 +4137,7 @@
 </p:notes>
 </file>
 
-<file path=ppt/notesSlides/notesSlide8.xml><?xml version="1.0" encoding="utf-8"?>
+<file path=ppt/notesSlides/notesSlide7.xml><?xml version="1.0" encoding="utf-8"?>
 <p:notes xmlns:a="http://schemas.openxmlformats.org/drawingml/2006/main" xmlns:r="http://schemas.openxmlformats.org/officeDocument/2006/relationships" xmlns:p="http://schemas.openxmlformats.org/presentationml/2006/main" showMasterSp="0" showMasterPhAnim="0">
   <p:cSld>
     <p:spTree>
@@ -4506,7 +4259,7 @@
 </p:notes>
 </file>
 
-<file path=ppt/notesSlides/notesSlide9.xml><?xml version="1.0" encoding="utf-8"?>
+<file path=ppt/notesSlides/notesSlide8.xml><?xml version="1.0" encoding="utf-8"?>
 <p:notes xmlns:a="http://schemas.openxmlformats.org/drawingml/2006/main" xmlns:r="http://schemas.openxmlformats.org/officeDocument/2006/relationships" xmlns:p="http://schemas.openxmlformats.org/presentationml/2006/main" showMasterSp="0" showMasterPhAnim="0">
   <p:cSld>
     <p:spTree>
@@ -4668,11 +4421,133 @@
             </a:pPr>
             <a:fld id="{00000000-1234-1234-1234-123412341234}" type="slidenum">
               <a:rPr lang="en-US"/>
-              <a:t>9</a:t>
+              <a:t>8</a:t>
             </a:fld>
             <a:endParaRPr/>
           </a:p>
         </p:txBody>
+      </p:sp>
+    </p:spTree>
+  </p:cSld>
+  <p:clrMapOvr>
+    <a:masterClrMapping/>
+  </p:clrMapOvr>
+</p:notes>
+</file>
+
+<file path=ppt/notesSlides/notesSlide9.xml><?xml version="1.0" encoding="utf-8"?>
+<p:notes xmlns:a="http://schemas.openxmlformats.org/drawingml/2006/main" xmlns:r="http://schemas.openxmlformats.org/officeDocument/2006/relationships" xmlns:p="http://schemas.openxmlformats.org/presentationml/2006/main" showMasterSp="0" showMasterPhAnim="0">
+  <p:cSld>
+    <p:spTree>
+      <p:nvGrpSpPr>
+        <p:cNvPr id="1" name="Shape 219"/>
+        <p:cNvGrpSpPr/>
+        <p:nvPr/>
+      </p:nvGrpSpPr>
+      <p:grpSpPr>
+        <a:xfrm>
+          <a:off x="0" y="0"/>
+          <a:ext cx="0" cy="0"/>
+          <a:chOff x="0" y="0"/>
+          <a:chExt cx="0" cy="0"/>
+        </a:xfrm>
+      </p:grpSpPr>
+      <p:sp>
+        <p:nvSpPr>
+          <p:cNvPr id="220" name="Google Shape;220;p11:notes"/>
+          <p:cNvSpPr txBox="1">
+            <a:spLocks noGrp="1"/>
+          </p:cNvSpPr>
+          <p:nvPr>
+            <p:ph type="body" idx="1"/>
+          </p:nvPr>
+        </p:nvSpPr>
+        <p:spPr>
+          <a:xfrm>
+            <a:off x="685800" y="4343400"/>
+            <a:ext cx="5486400" cy="4114800"/>
+          </a:xfrm>
+          <a:prstGeom prst="rect">
+            <a:avLst/>
+          </a:prstGeom>
+          <a:noFill/>
+          <a:ln>
+            <a:noFill/>
+          </a:ln>
+        </p:spPr>
+        <p:txBody>
+          <a:bodyPr spcFirstLastPara="1" wrap="square" lIns="91425" tIns="45700" rIns="91425" bIns="45700" anchor="t" anchorCtr="0">
+            <a:noAutofit/>
+          </a:bodyPr>
+          <a:lstStyle/>
+          <a:p>
+            <a:pPr marL="0" lvl="0" indent="0" algn="l" rtl="0">
+              <a:lnSpc>
+                <a:spcPct val="100000"/>
+              </a:lnSpc>
+              <a:spcBef>
+                <a:spcPts val="360"/>
+              </a:spcBef>
+              <a:spcAft>
+                <a:spcPts val="0"/>
+              </a:spcAft>
+              <a:buSzPts val="1400"/>
+              <a:buNone/>
+            </a:pPr>
+            <a:endParaRPr/>
+          </a:p>
+        </p:txBody>
+      </p:sp>
+      <p:sp>
+        <p:nvSpPr>
+          <p:cNvPr id="221" name="Google Shape;221;p11:notes"/>
+          <p:cNvSpPr>
+            <a:spLocks noGrp="1" noRot="1" noChangeAspect="1"/>
+          </p:cNvSpPr>
+          <p:nvPr>
+            <p:ph type="sldImg" idx="2"/>
+          </p:nvPr>
+        </p:nvSpPr>
+        <p:spPr>
+          <a:xfrm>
+            <a:off x="1143000" y="685800"/>
+            <a:ext cx="4572000" cy="3429000"/>
+          </a:xfrm>
+          <a:custGeom>
+            <a:avLst/>
+            <a:gdLst/>
+            <a:ahLst/>
+            <a:cxnLst/>
+            <a:rect l="l" t="t" r="r" b="b"/>
+            <a:pathLst>
+              <a:path w="120000" h="120000" extrusionOk="0">
+                <a:moveTo>
+                  <a:pt x="0" y="0"/>
+                </a:moveTo>
+                <a:lnTo>
+                  <a:pt x="120000" y="0"/>
+                </a:lnTo>
+                <a:lnTo>
+                  <a:pt x="120000" y="120000"/>
+                </a:lnTo>
+                <a:lnTo>
+                  <a:pt x="0" y="120000"/>
+                </a:lnTo>
+                <a:close/>
+              </a:path>
+            </a:pathLst>
+          </a:custGeom>
+          <a:noFill/>
+          <a:ln w="12700" cap="flat" cmpd="sng">
+            <a:solidFill>
+              <a:srgbClr val="000000"/>
+            </a:solidFill>
+            <a:prstDash val="solid"/>
+            <a:round/>
+            <a:headEnd type="none" w="sm" len="sm"/>
+            <a:tailEnd type="none" w="sm" len="sm"/>
+          </a:ln>
+        </p:spPr>
       </p:sp>
     </p:spTree>
   </p:cSld>
@@ -19776,349 +19651,6 @@
   <p:cSld>
     <p:spTree>
       <p:nvGrpSpPr>
-        <p:cNvPr id="1" name="Shape 222"/>
-        <p:cNvGrpSpPr/>
-        <p:nvPr/>
-      </p:nvGrpSpPr>
-      <p:grpSpPr>
-        <a:xfrm>
-          <a:off x="0" y="0"/>
-          <a:ext cx="0" cy="0"/>
-          <a:chOff x="0" y="0"/>
-          <a:chExt cx="0" cy="0"/>
-        </a:xfrm>
-      </p:grpSpPr>
-      <p:sp>
-        <p:nvSpPr>
-          <p:cNvPr id="223" name="Google Shape;223;p11"/>
-          <p:cNvSpPr txBox="1">
-            <a:spLocks noGrp="1"/>
-          </p:cNvSpPr>
-          <p:nvPr>
-            <p:ph type="title"/>
-          </p:nvPr>
-        </p:nvSpPr>
-        <p:spPr>
-          <a:xfrm>
-            <a:off x="457200" y="381000"/>
-            <a:ext cx="8229600" cy="838200"/>
-          </a:xfrm>
-          <a:prstGeom prst="rect">
-            <a:avLst/>
-          </a:prstGeom>
-          <a:noFill/>
-          <a:ln>
-            <a:noFill/>
-          </a:ln>
-        </p:spPr>
-        <p:txBody>
-          <a:bodyPr spcFirstLastPara="1" wrap="square" lIns="91425" tIns="45700" rIns="91425" bIns="45700" anchor="t" anchorCtr="0">
-            <a:noAutofit/>
-          </a:bodyPr>
-          <a:lstStyle/>
-          <a:p>
-            <a:pPr marL="0" lvl="0" indent="0" algn="ctr" rtl="0">
-              <a:lnSpc>
-                <a:spcPct val="100000"/>
-              </a:lnSpc>
-              <a:spcBef>
-                <a:spcPts val="0"/>
-              </a:spcBef>
-              <a:spcAft>
-                <a:spcPts val="0"/>
-              </a:spcAft>
-              <a:buSzPts val="1400"/>
-              <a:buNone/>
-            </a:pPr>
-            <a:r>
-              <a:rPr lang="en-US"/>
-              <a:t>True Mass Balance May Not Be Desirable</a:t>
-            </a:r>
-            <a:endParaRPr/>
-          </a:p>
-        </p:txBody>
-      </p:sp>
-      <p:sp>
-        <p:nvSpPr>
-          <p:cNvPr id="224" name="Google Shape;224;p11"/>
-          <p:cNvSpPr txBox="1">
-            <a:spLocks noGrp="1"/>
-          </p:cNvSpPr>
-          <p:nvPr>
-            <p:ph type="body" idx="1"/>
-          </p:nvPr>
-        </p:nvSpPr>
-        <p:spPr>
-          <a:xfrm>
-            <a:off x="457200" y="2209799"/>
-            <a:ext cx="8229600" cy="2948941"/>
-          </a:xfrm>
-          <a:prstGeom prst="rect">
-            <a:avLst/>
-          </a:prstGeom>
-          <a:noFill/>
-          <a:ln>
-            <a:noFill/>
-          </a:ln>
-        </p:spPr>
-        <p:txBody>
-          <a:bodyPr spcFirstLastPara="1" wrap="square" lIns="91425" tIns="45700" rIns="91425" bIns="45700" anchor="t" anchorCtr="0">
-            <a:noAutofit/>
-          </a:bodyPr>
-          <a:lstStyle/>
-          <a:p>
-            <a:pPr marL="342900" lvl="0" indent="-342900" algn="l" rtl="0">
-              <a:lnSpc>
-                <a:spcPct val="100000"/>
-              </a:lnSpc>
-              <a:spcBef>
-                <a:spcPts val="0"/>
-              </a:spcBef>
-              <a:spcAft>
-                <a:spcPts val="0"/>
-              </a:spcAft>
-              <a:buClr>
-                <a:schemeClr val="dk1"/>
-              </a:buClr>
-              <a:buSzPts val="2400"/>
-              <a:buChar char="•"/>
-            </a:pPr>
-            <a:r>
-              <a:rPr lang="en-US"/>
-              <a:t>True mass balance precludes having implicit chemical species</a:t>
-            </a:r>
-            <a:endParaRPr/>
-          </a:p>
-          <a:p>
-            <a:pPr marL="742950" lvl="1" indent="-285750" algn="l" rtl="0">
-              <a:lnSpc>
-                <a:spcPct val="100000"/>
-              </a:lnSpc>
-              <a:spcBef>
-                <a:spcPts val="480"/>
-              </a:spcBef>
-              <a:spcAft>
-                <a:spcPts val="0"/>
-              </a:spcAft>
-              <a:buClr>
-                <a:schemeClr val="dk1"/>
-              </a:buClr>
-              <a:buSzPts val="2400"/>
-              <a:buChar char="–"/>
-            </a:pPr>
-            <a:r>
-              <a:rPr lang="en-US"/>
-              <a:t>Present in large quantities so that concentration does not change (e.g., water)</a:t>
-            </a:r>
-            <a:endParaRPr/>
-          </a:p>
-          <a:p>
-            <a:pPr marL="342900" lvl="0" indent="-342900" algn="l" rtl="0">
-              <a:lnSpc>
-                <a:spcPct val="100000"/>
-              </a:lnSpc>
-              <a:spcBef>
-                <a:spcPts val="480"/>
-              </a:spcBef>
-              <a:spcAft>
-                <a:spcPts val="0"/>
-              </a:spcAft>
-              <a:buClr>
-                <a:schemeClr val="dk1"/>
-              </a:buClr>
-              <a:buSzPts val="2400"/>
-              <a:buChar char="•"/>
-            </a:pPr>
-            <a:r>
-              <a:rPr lang="en-US"/>
-              <a:t>Appeal of implicit chemical species</a:t>
-            </a:r>
-            <a:endParaRPr/>
-          </a:p>
-          <a:p>
-            <a:pPr marL="742950" lvl="1" indent="-285750" algn="l" rtl="0">
-              <a:lnSpc>
-                <a:spcPct val="100000"/>
-              </a:lnSpc>
-              <a:spcBef>
-                <a:spcPts val="480"/>
-              </a:spcBef>
-              <a:spcAft>
-                <a:spcPts val="0"/>
-              </a:spcAft>
-              <a:buClr>
-                <a:schemeClr val="dk1"/>
-              </a:buClr>
-              <a:buSzPts val="2400"/>
-              <a:buChar char="–"/>
-            </a:pPr>
-            <a:r>
-              <a:rPr lang="en-US"/>
-              <a:t>Simpler reactions</a:t>
-            </a:r>
-            <a:endParaRPr/>
-          </a:p>
-          <a:p>
-            <a:pPr marL="742950" lvl="1" indent="-285750" algn="l" rtl="0">
-              <a:lnSpc>
-                <a:spcPct val="100000"/>
-              </a:lnSpc>
-              <a:spcBef>
-                <a:spcPts val="480"/>
-              </a:spcBef>
-              <a:spcAft>
-                <a:spcPts val="0"/>
-              </a:spcAft>
-              <a:buClr>
-                <a:schemeClr val="dk1"/>
-              </a:buClr>
-              <a:buSzPts val="2400"/>
-              <a:buChar char="–"/>
-            </a:pPr>
-            <a:r>
-              <a:rPr lang="en-US"/>
-              <a:t>More efficient simulation</a:t>
-            </a:r>
-            <a:endParaRPr/>
-          </a:p>
-        </p:txBody>
-      </p:sp>
-      <p:sp>
-        <p:nvSpPr>
-          <p:cNvPr id="225" name="Google Shape;225;p11"/>
-          <p:cNvSpPr txBox="1">
-            <a:spLocks noGrp="1"/>
-          </p:cNvSpPr>
-          <p:nvPr>
-            <p:ph type="sldNum" idx="12"/>
-          </p:nvPr>
-        </p:nvSpPr>
-        <p:spPr>
-          <a:xfrm>
-            <a:off x="7543801" y="6248400"/>
-            <a:ext cx="533400" cy="365125"/>
-          </a:xfrm>
-          <a:prstGeom prst="rect">
-            <a:avLst/>
-          </a:prstGeom>
-          <a:noFill/>
-          <a:ln>
-            <a:noFill/>
-          </a:ln>
-        </p:spPr>
-        <p:txBody>
-          <a:bodyPr spcFirstLastPara="1" wrap="square" lIns="91425" tIns="45700" rIns="91425" bIns="45700" anchor="t" anchorCtr="0">
-            <a:noAutofit/>
-          </a:bodyPr>
-          <a:lstStyle/>
-          <a:p>
-            <a:pPr marL="0" lvl="0" indent="0" algn="l" rtl="0">
-              <a:lnSpc>
-                <a:spcPct val="100000"/>
-              </a:lnSpc>
-              <a:spcBef>
-                <a:spcPts val="0"/>
-              </a:spcBef>
-              <a:spcAft>
-                <a:spcPts val="0"/>
-              </a:spcAft>
-              <a:buSzPts val="1800"/>
-              <a:buNone/>
-            </a:pPr>
-            <a:fld id="{00000000-1234-1234-1234-123412341234}" type="slidenum">
-              <a:rPr lang="en-US"/>
-              <a:t>10</a:t>
-            </a:fld>
-            <a:endParaRPr/>
-          </a:p>
-        </p:txBody>
-      </p:sp>
-      <p:sp>
-        <p:nvSpPr>
-          <p:cNvPr id="226" name="Google Shape;226;p11"/>
-          <p:cNvSpPr txBox="1"/>
-          <p:nvPr/>
-        </p:nvSpPr>
-        <p:spPr>
-          <a:xfrm>
-            <a:off x="2331653" y="1333142"/>
-            <a:ext cx="3841180" cy="430887"/>
-          </a:xfrm>
-          <a:prstGeom prst="rect">
-            <a:avLst/>
-          </a:prstGeom>
-          <a:blipFill rotWithShape="1">
-            <a:blip r:embed="rId3">
-              <a:alphaModFix/>
-            </a:blip>
-            <a:stretch>
-              <a:fillRect b="-17641"/>
-            </a:stretch>
-          </a:blipFill>
-          <a:ln>
-            <a:noFill/>
-          </a:ln>
-        </p:spPr>
-        <p:txBody>
-          <a:bodyPr spcFirstLastPara="1" wrap="square" lIns="91425" tIns="45700" rIns="91425" bIns="45700" anchor="t" anchorCtr="0">
-            <a:noAutofit/>
-          </a:bodyPr>
-          <a:lstStyle/>
-          <a:p>
-            <a:pPr marL="0" marR="0" lvl="0" indent="0" algn="l" rtl="0">
-              <a:lnSpc>
-                <a:spcPct val="100000"/>
-              </a:lnSpc>
-              <a:spcBef>
-                <a:spcPts val="0"/>
-              </a:spcBef>
-              <a:spcAft>
-                <a:spcPts val="0"/>
-              </a:spcAft>
-              <a:buClr>
-                <a:srgbClr val="000000"/>
-              </a:buClr>
-              <a:buSzPts val="1800"/>
-              <a:buFont typeface="Arial"/>
-              <a:buNone/>
-            </a:pPr>
-            <a:r>
-              <a:rPr lang="en-US" sz="1800" b="0" i="0" u="none" strike="noStrike" cap="none">
-                <a:solidFill>
-                  <a:srgbClr val="000000"/>
-                </a:solidFill>
-                <a:latin typeface="Arial"/>
-                <a:ea typeface="Arial"/>
-                <a:cs typeface="Arial"/>
-                <a:sym typeface="Arial"/>
-              </a:rPr>
-              <a:t> </a:t>
-            </a:r>
-            <a:endParaRPr sz="1400" b="0" i="0" u="none" strike="noStrike" cap="none">
-              <a:solidFill>
-                <a:srgbClr val="000000"/>
-              </a:solidFill>
-              <a:latin typeface="Arial"/>
-              <a:ea typeface="Arial"/>
-              <a:cs typeface="Arial"/>
-              <a:sym typeface="Arial"/>
-            </a:endParaRPr>
-          </a:p>
-        </p:txBody>
-      </p:sp>
-    </p:spTree>
-  </p:cSld>
-  <p:clrMapOvr>
-    <a:masterClrMapping/>
-  </p:clrMapOvr>
-</p:sld>
-</file>
-
-<file path=ppt/slides/slide11.xml><?xml version="1.0" encoding="utf-8"?>
-<p:sld xmlns:a="http://schemas.openxmlformats.org/drawingml/2006/main" xmlns:r="http://schemas.openxmlformats.org/officeDocument/2006/relationships" xmlns:p="http://schemas.openxmlformats.org/presentationml/2006/main">
-  <p:cSld>
-    <p:spTree>
-      <p:nvGrpSpPr>
         <p:cNvPr id="1" name="Shape 230"/>
         <p:cNvGrpSpPr/>
         <p:nvPr/>
@@ -20301,7 +19833,7 @@
             </a:pPr>
             <a:fld id="{00000000-1234-1234-1234-123412341234}" type="slidenum">
               <a:rPr lang="en-US"/>
-              <a:t>11</a:t>
+              <a:t>10</a:t>
             </a:fld>
             <a:endParaRPr/>
           </a:p>
@@ -21282,7 +20814,7 @@
 </p:sld>
 </file>
 
-<file path=ppt/slides/slide12.xml><?xml version="1.0" encoding="utf-8"?>
+<file path=ppt/slides/slide11.xml><?xml version="1.0" encoding="utf-8"?>
 <p:sld xmlns:a="http://schemas.openxmlformats.org/drawingml/2006/main" xmlns:r="http://schemas.openxmlformats.org/officeDocument/2006/relationships" xmlns:p="http://schemas.openxmlformats.org/presentationml/2006/main">
   <p:cSld>
     <p:spTree>
@@ -21492,7 +21024,7 @@
             </a:pPr>
             <a:fld id="{00000000-1234-1234-1234-123412341234}" type="slidenum">
               <a:rPr lang="en-US"/>
-              <a:t>12</a:t>
+              <a:t>11</a:t>
             </a:fld>
             <a:endParaRPr/>
           </a:p>
@@ -23481,7 +23013,7 @@
 </p:sld>
 </file>
 
-<file path=ppt/slides/slide13.xml><?xml version="1.0" encoding="utf-8"?>
+<file path=ppt/slides/slide12.xml><?xml version="1.0" encoding="utf-8"?>
 <p:sld xmlns:a="http://schemas.openxmlformats.org/drawingml/2006/main" xmlns:r="http://schemas.openxmlformats.org/officeDocument/2006/relationships" xmlns:p="http://schemas.openxmlformats.org/presentationml/2006/main">
   <p:cSld>
     <p:spTree>
@@ -23744,7 +23276,7 @@
             </a:pPr>
             <a:fld id="{00000000-1234-1234-1234-123412341234}" type="slidenum">
               <a:rPr lang="en-US"/>
-              <a:t>13</a:t>
+              <a:t>12</a:t>
             </a:fld>
             <a:endParaRPr/>
           </a:p>
@@ -24229,7 +23761,7 @@
 </p:sld>
 </file>
 
-<file path=ppt/slides/slide14.xml><?xml version="1.0" encoding="utf-8"?>
+<file path=ppt/slides/slide13.xml><?xml version="1.0" encoding="utf-8"?>
 <p:sld xmlns:a="http://schemas.openxmlformats.org/drawingml/2006/main" xmlns:r="http://schemas.openxmlformats.org/officeDocument/2006/relationships" xmlns:p="http://schemas.openxmlformats.org/presentationml/2006/main">
   <p:cSld>
     <p:spTree>
@@ -24290,7 +23822,7 @@
             </a:pPr>
             <a:fld id="{00000000-1234-1234-1234-123412341234}" type="slidenum">
               <a:rPr lang="en-US"/>
-              <a:t>14</a:t>
+              <a:t>13</a:t>
             </a:fld>
             <a:endParaRPr/>
           </a:p>
@@ -24852,7 +24384,7 @@
 </p:sld>
 </file>
 
-<file path=ppt/slides/slide15.xml><?xml version="1.0" encoding="utf-8"?>
+<file path=ppt/slides/slide14.xml><?xml version="1.0" encoding="utf-8"?>
 <p:sld xmlns:a="http://schemas.openxmlformats.org/drawingml/2006/main" xmlns:r="http://schemas.openxmlformats.org/officeDocument/2006/relationships" xmlns:p="http://schemas.openxmlformats.org/presentationml/2006/main">
   <p:cSld>
     <p:spTree>
@@ -24963,7 +24495,7 @@
             </a:pPr>
             <a:fld id="{00000000-1234-1234-1234-123412341234}" type="slidenum">
               <a:rPr lang="en-US"/>
-              <a:t>15</a:t>
+              <a:t>14</a:t>
             </a:fld>
             <a:endParaRPr/>
           </a:p>
@@ -26009,7 +25541,7 @@
 </p:sld>
 </file>
 
-<file path=ppt/slides/slide16.xml><?xml version="1.0" encoding="utf-8"?>
+<file path=ppt/slides/slide15.xml><?xml version="1.0" encoding="utf-8"?>
 <p:sld xmlns:a="http://schemas.openxmlformats.org/drawingml/2006/main" xmlns:r="http://schemas.openxmlformats.org/officeDocument/2006/relationships" xmlns:p="http://schemas.openxmlformats.org/presentationml/2006/main">
   <p:cSld>
     <p:spTree>
@@ -26120,7 +25652,7 @@
             </a:pPr>
             <a:fld id="{00000000-1234-1234-1234-123412341234}" type="slidenum">
               <a:rPr lang="en-US"/>
-              <a:t>16</a:t>
+              <a:t>15</a:t>
             </a:fld>
             <a:endParaRPr/>
           </a:p>
@@ -26390,7 +25922,7 @@
 </p:sld>
 </file>
 
-<file path=ppt/slides/slide17.xml><?xml version="1.0" encoding="utf-8"?>
+<file path=ppt/slides/slide16.xml><?xml version="1.0" encoding="utf-8"?>
 <p:sld xmlns:a="http://schemas.openxmlformats.org/drawingml/2006/main" xmlns:r="http://schemas.openxmlformats.org/officeDocument/2006/relationships" xmlns:p="http://schemas.openxmlformats.org/presentationml/2006/main">
   <p:cSld>
     <p:spTree>
@@ -26501,7 +26033,7 @@
             </a:pPr>
             <a:fld id="{00000000-1234-1234-1234-123412341234}" type="slidenum">
               <a:rPr lang="en-US"/>
-              <a:t>17</a:t>
+              <a:t>16</a:t>
             </a:fld>
             <a:endParaRPr/>
           </a:p>
@@ -28799,7 +28331,7 @@
 </p:sld>
 </file>
 
-<file path=ppt/slides/slide18.xml><?xml version="1.0" encoding="utf-8"?>
+<file path=ppt/slides/slide17.xml><?xml version="1.0" encoding="utf-8"?>
 <p:sld xmlns:a="http://schemas.openxmlformats.org/drawingml/2006/main" xmlns:r="http://schemas.openxmlformats.org/officeDocument/2006/relationships" xmlns:p="http://schemas.openxmlformats.org/presentationml/2006/main">
   <p:cSld>
     <p:spTree>
@@ -28910,7 +28442,7 @@
             </a:pPr>
             <a:fld id="{00000000-1234-1234-1234-123412341234}" type="slidenum">
               <a:rPr lang="en-US"/>
-              <a:t>18</a:t>
+              <a:t>17</a:t>
             </a:fld>
             <a:endParaRPr/>
           </a:p>
@@ -30171,7 +29703,7 @@
 </p:sld>
 </file>
 
-<file path=ppt/slides/slide19.xml><?xml version="1.0" encoding="utf-8"?>
+<file path=ppt/slides/slide18.xml><?xml version="1.0" encoding="utf-8"?>
 <p:sld xmlns:a="http://schemas.openxmlformats.org/drawingml/2006/main" xmlns:r="http://schemas.openxmlformats.org/officeDocument/2006/relationships" xmlns:p="http://schemas.openxmlformats.org/presentationml/2006/main">
   <p:cSld>
     <p:spTree>
@@ -30358,7 +29890,7 @@
             </a:pPr>
             <a:fld id="{00000000-1234-1234-1234-123412341234}" type="slidenum">
               <a:rPr lang="en-US"/>
-              <a:t>19</a:t>
+              <a:t>18</a:t>
             </a:fld>
             <a:endParaRPr/>
           </a:p>
@@ -30528,6 +30060,473 @@
 </p:sld>
 </file>
 
+<file path=ppt/slides/slide19.xml><?xml version="1.0" encoding="utf-8"?>
+<p:sld xmlns:a="http://schemas.openxmlformats.org/drawingml/2006/main" xmlns:r="http://schemas.openxmlformats.org/officeDocument/2006/relationships" xmlns:p="http://schemas.openxmlformats.org/presentationml/2006/main">
+  <p:cSld>
+    <p:spTree>
+      <p:nvGrpSpPr>
+        <p:cNvPr id="1" name="Shape 374"/>
+        <p:cNvGrpSpPr/>
+        <p:nvPr/>
+      </p:nvGrpSpPr>
+      <p:grpSpPr>
+        <a:xfrm>
+          <a:off x="0" y="0"/>
+          <a:ext cx="0" cy="0"/>
+          <a:chOff x="0" y="0"/>
+          <a:chExt cx="0" cy="0"/>
+        </a:xfrm>
+      </p:grpSpPr>
+      <p:sp>
+        <p:nvSpPr>
+          <p:cNvPr id="375" name="Google Shape;375;p21"/>
+          <p:cNvSpPr txBox="1">
+            <a:spLocks noGrp="1"/>
+          </p:cNvSpPr>
+          <p:nvPr>
+            <p:ph type="title"/>
+          </p:nvPr>
+        </p:nvSpPr>
+        <p:spPr>
+          <a:xfrm>
+            <a:off x="457200" y="228600"/>
+            <a:ext cx="8229600" cy="838200"/>
+          </a:xfrm>
+          <a:prstGeom prst="rect">
+            <a:avLst/>
+          </a:prstGeom>
+          <a:noFill/>
+          <a:ln>
+            <a:noFill/>
+          </a:ln>
+        </p:spPr>
+        <p:txBody>
+          <a:bodyPr spcFirstLastPara="1" wrap="square" lIns="91425" tIns="45700" rIns="91425" bIns="45700" anchor="t" anchorCtr="0">
+            <a:noAutofit/>
+          </a:bodyPr>
+          <a:lstStyle/>
+          <a:p>
+            <a:pPr marL="0" lvl="0" indent="0" algn="ctr" rtl="0">
+              <a:lnSpc>
+                <a:spcPct val="100000"/>
+              </a:lnSpc>
+              <a:spcBef>
+                <a:spcPts val="0"/>
+              </a:spcBef>
+              <a:spcAft>
+                <a:spcPts val="0"/>
+              </a:spcAft>
+              <a:buSzPts val="1400"/>
+              <a:buNone/>
+            </a:pPr>
+            <a:r>
+              <a:rPr lang="en-US"/>
+              <a:t>Isolating ErbB Signaling (BioModels 255)</a:t>
+            </a:r>
+            <a:endParaRPr/>
+          </a:p>
+        </p:txBody>
+      </p:sp>
+      <p:sp>
+        <p:nvSpPr>
+          <p:cNvPr id="376" name="Google Shape;376;p21"/>
+          <p:cNvSpPr txBox="1">
+            <a:spLocks noGrp="1"/>
+          </p:cNvSpPr>
+          <p:nvPr>
+            <p:ph type="sldNum" idx="12"/>
+          </p:nvPr>
+        </p:nvSpPr>
+        <p:spPr>
+          <a:xfrm>
+            <a:off x="7565366" y="6324600"/>
+            <a:ext cx="511834" cy="365125"/>
+          </a:xfrm>
+          <a:prstGeom prst="rect">
+            <a:avLst/>
+          </a:prstGeom>
+          <a:noFill/>
+          <a:ln>
+            <a:noFill/>
+          </a:ln>
+        </p:spPr>
+        <p:txBody>
+          <a:bodyPr spcFirstLastPara="1" wrap="square" lIns="91425" tIns="45700" rIns="91425" bIns="45700" anchor="t" anchorCtr="0">
+            <a:noAutofit/>
+          </a:bodyPr>
+          <a:lstStyle/>
+          <a:p>
+            <a:pPr marL="0" lvl="0" indent="0" algn="l" rtl="0">
+              <a:lnSpc>
+                <a:spcPct val="100000"/>
+              </a:lnSpc>
+              <a:spcBef>
+                <a:spcPts val="0"/>
+              </a:spcBef>
+              <a:spcAft>
+                <a:spcPts val="0"/>
+              </a:spcAft>
+              <a:buSzPts val="1800"/>
+              <a:buNone/>
+            </a:pPr>
+            <a:fld id="{00000000-1234-1234-1234-123412341234}" type="slidenum">
+              <a:rPr lang="en-US"/>
+              <a:t>19</a:t>
+            </a:fld>
+            <a:endParaRPr/>
+          </a:p>
+        </p:txBody>
+      </p:sp>
+      <p:pic>
+        <p:nvPicPr>
+          <p:cNvPr id="377" name="Google Shape;377;p21" descr="A picture containing text&#10;&#10;Description automatically generated"/>
+          <p:cNvPicPr preferRelativeResize="0"/>
+          <p:nvPr/>
+        </p:nvPicPr>
+        <p:blipFill rotWithShape="1">
+          <a:blip r:embed="rId3">
+            <a:alphaModFix/>
+          </a:blip>
+          <a:srcRect/>
+          <a:stretch/>
+        </p:blipFill>
+        <p:spPr>
+          <a:xfrm>
+            <a:off x="970026" y="1669011"/>
+            <a:ext cx="6677384" cy="4459895"/>
+          </a:xfrm>
+          <a:prstGeom prst="rect">
+            <a:avLst/>
+          </a:prstGeom>
+          <a:noFill/>
+          <a:ln>
+            <a:noFill/>
+          </a:ln>
+        </p:spPr>
+      </p:pic>
+      <p:sp>
+        <p:nvSpPr>
+          <p:cNvPr id="378" name="Google Shape;378;p21"/>
+          <p:cNvSpPr txBox="1"/>
+          <p:nvPr/>
+        </p:nvSpPr>
+        <p:spPr>
+          <a:xfrm>
+            <a:off x="970026" y="1103985"/>
+            <a:ext cx="5596404" cy="369332"/>
+          </a:xfrm>
+          <a:prstGeom prst="rect">
+            <a:avLst/>
+          </a:prstGeom>
+          <a:noFill/>
+          <a:ln>
+            <a:noFill/>
+          </a:ln>
+        </p:spPr>
+        <p:txBody>
+          <a:bodyPr spcFirstLastPara="1" wrap="square" lIns="91425" tIns="45700" rIns="91425" bIns="45700" anchor="t" anchorCtr="0">
+            <a:spAutoFit/>
+          </a:bodyPr>
+          <a:lstStyle/>
+          <a:p>
+            <a:pPr marL="0" marR="0" lvl="0" indent="0" algn="l" rtl="0">
+              <a:lnSpc>
+                <a:spcPct val="100000"/>
+              </a:lnSpc>
+              <a:spcBef>
+                <a:spcPts val="0"/>
+              </a:spcBef>
+              <a:spcAft>
+                <a:spcPts val="0"/>
+              </a:spcAft>
+              <a:buClr>
+                <a:srgbClr val="000000"/>
+              </a:buClr>
+              <a:buSzPts val="1800"/>
+              <a:buFont typeface="Arial"/>
+              <a:buNone/>
+            </a:pPr>
+            <a:r>
+              <a:rPr lang="en-US" sz="1800" b="0" i="0" u="none" strike="noStrike" cap="none">
+                <a:solidFill>
+                  <a:schemeClr val="dk1"/>
+                </a:solidFill>
+                <a:latin typeface="Arial"/>
+                <a:ea typeface="Arial"/>
+                <a:cs typeface="Arial"/>
+                <a:sym typeface="Arial"/>
+              </a:rPr>
+              <a:t>Is there a stoichiometric inconsistency here? Where?</a:t>
+            </a:r>
+            <a:endParaRPr sz="1400" b="0" i="0" u="none" strike="noStrike" cap="none">
+              <a:solidFill>
+                <a:srgbClr val="000000"/>
+              </a:solidFill>
+              <a:latin typeface="Arial"/>
+              <a:ea typeface="Arial"/>
+              <a:cs typeface="Arial"/>
+              <a:sym typeface="Arial"/>
+            </a:endParaRPr>
+          </a:p>
+        </p:txBody>
+      </p:sp>
+      <p:sp>
+        <p:nvSpPr>
+          <p:cNvPr id="379" name="Google Shape;379;p21"/>
+          <p:cNvSpPr/>
+          <p:nvPr/>
+        </p:nvSpPr>
+        <p:spPr>
+          <a:xfrm>
+            <a:off x="1077457" y="4014225"/>
+            <a:ext cx="7181088" cy="2218944"/>
+          </a:xfrm>
+          <a:prstGeom prst="rect">
+            <a:avLst/>
+          </a:prstGeom>
+          <a:solidFill>
+            <a:schemeClr val="lt1"/>
+          </a:solidFill>
+          <a:ln>
+            <a:noFill/>
+          </a:ln>
+          <a:effectLst>
+            <a:outerShdw dist="23000" sx="1000" sy="1000" rotWithShape="0">
+              <a:srgbClr val="000000"/>
+            </a:outerShdw>
+          </a:effectLst>
+        </p:spPr>
+        <p:txBody>
+          <a:bodyPr spcFirstLastPara="1" wrap="square" lIns="91425" tIns="45700" rIns="91425" bIns="45700" anchor="ctr" anchorCtr="0">
+            <a:noAutofit/>
+          </a:bodyPr>
+          <a:lstStyle/>
+          <a:p>
+            <a:pPr marL="0" marR="0" lvl="0" indent="0" algn="ctr" rtl="0">
+              <a:lnSpc>
+                <a:spcPct val="100000"/>
+              </a:lnSpc>
+              <a:spcBef>
+                <a:spcPts val="0"/>
+              </a:spcBef>
+              <a:spcAft>
+                <a:spcPts val="0"/>
+              </a:spcAft>
+              <a:buClr>
+                <a:srgbClr val="000000"/>
+              </a:buClr>
+              <a:buSzPts val="1800"/>
+              <a:buFont typeface="Arial"/>
+              <a:buNone/>
+            </a:pPr>
+            <a:endParaRPr sz="1800" b="0" i="0" u="none" strike="noStrike" cap="none">
+              <a:solidFill>
+                <a:schemeClr val="lt1"/>
+              </a:solidFill>
+              <a:latin typeface="Arial"/>
+              <a:ea typeface="Arial"/>
+              <a:cs typeface="Arial"/>
+              <a:sym typeface="Arial"/>
+            </a:endParaRPr>
+          </a:p>
+        </p:txBody>
+      </p:sp>
+      <p:sp>
+        <p:nvSpPr>
+          <p:cNvPr id="380" name="Google Shape;380;p21"/>
+          <p:cNvSpPr txBox="1"/>
+          <p:nvPr/>
+        </p:nvSpPr>
+        <p:spPr>
+          <a:xfrm>
+            <a:off x="5358384" y="2027889"/>
+            <a:ext cx="3511296" cy="646331"/>
+          </a:xfrm>
+          <a:prstGeom prst="rect">
+            <a:avLst/>
+          </a:prstGeom>
+          <a:solidFill>
+            <a:srgbClr val="F2F2F2"/>
+          </a:solidFill>
+          <a:ln>
+            <a:noFill/>
+          </a:ln>
+        </p:spPr>
+        <p:txBody>
+          <a:bodyPr spcFirstLastPara="1" wrap="square" lIns="91425" tIns="45700" rIns="91425" bIns="45700" anchor="t" anchorCtr="0">
+            <a:spAutoFit/>
+          </a:bodyPr>
+          <a:lstStyle/>
+          <a:p>
+            <a:pPr marL="0" marR="0" lvl="0" indent="0" algn="l" rtl="0">
+              <a:lnSpc>
+                <a:spcPct val="100000"/>
+              </a:lnSpc>
+              <a:spcBef>
+                <a:spcPts val="0"/>
+              </a:spcBef>
+              <a:spcAft>
+                <a:spcPts val="0"/>
+              </a:spcAft>
+              <a:buClr>
+                <a:srgbClr val="000000"/>
+              </a:buClr>
+              <a:buSzPts val="1800"/>
+              <a:buFont typeface="Arial"/>
+              <a:buNone/>
+            </a:pPr>
+            <a:r>
+              <a:rPr lang="en-US" sz="1800" b="1" i="0" u="none" strike="noStrike" cap="none">
+                <a:solidFill>
+                  <a:schemeClr val="dk1"/>
+                </a:solidFill>
+                <a:latin typeface="Arial"/>
+                <a:ea typeface="Arial"/>
+                <a:cs typeface="Arial"/>
+                <a:sym typeface="Arial"/>
+              </a:rPr>
+              <a:t>Isolating errors is required to remediate complex errors.</a:t>
+            </a:r>
+            <a:endParaRPr sz="1400" b="0" i="0" u="none" strike="noStrike" cap="none">
+              <a:solidFill>
+                <a:srgbClr val="000000"/>
+              </a:solidFill>
+              <a:latin typeface="Arial"/>
+              <a:ea typeface="Arial"/>
+              <a:cs typeface="Arial"/>
+              <a:sym typeface="Arial"/>
+            </a:endParaRPr>
+          </a:p>
+        </p:txBody>
+      </p:sp>
+    </p:spTree>
+  </p:cSld>
+  <p:clrMapOvr>
+    <a:masterClrMapping/>
+  </p:clrMapOvr>
+  <p:timing>
+    <p:tnLst>
+      <p:par>
+        <p:cTn id="1" dur="indefinite" restart="never" nodeType="tmRoot">
+          <p:childTnLst>
+            <p:seq concurrent="1" nextAc="seek">
+              <p:cTn id="2" dur="indefinite" nodeType="mainSeq">
+                <p:childTnLst>
+                  <p:par>
+                    <p:cTn id="3" fill="hold">
+                      <p:stCondLst>
+                        <p:cond delay="indefinite"/>
+                      </p:stCondLst>
+                      <p:childTnLst>
+                        <p:par>
+                          <p:cTn id="4" fill="hold">
+                            <p:stCondLst>
+                              <p:cond delay="0"/>
+                            </p:stCondLst>
+                            <p:childTnLst>
+                              <p:par>
+                                <p:cTn id="5" presetID="1" presetClass="exit" presetSubtype="0" fill="hold" nodeType="clickEffect">
+                                  <p:stCondLst>
+                                    <p:cond delay="0"/>
+                                  </p:stCondLst>
+                                  <p:childTnLst>
+                                    <p:set>
+                                      <p:cBhvr>
+                                        <p:cTn id="6" dur="1" fill="hold">
+                                          <p:stCondLst>
+                                            <p:cond delay="1"/>
+                                          </p:stCondLst>
+                                        </p:cTn>
+                                        <p:tgtEl>
+                                          <p:spTgt spid="379"/>
+                                        </p:tgtEl>
+                                        <p:attrNameLst>
+                                          <p:attrName>style.visibility</p:attrName>
+                                        </p:attrNameLst>
+                                      </p:cBhvr>
+                                      <p:to>
+                                        <p:strVal val="hidden"/>
+                                      </p:to>
+                                    </p:set>
+                                  </p:childTnLst>
+                                </p:cTn>
+                              </p:par>
+                            </p:childTnLst>
+                          </p:cTn>
+                        </p:par>
+                      </p:childTnLst>
+                    </p:cTn>
+                  </p:par>
+                  <p:par>
+                    <p:cTn id="7" fill="hold">
+                      <p:stCondLst>
+                        <p:cond delay="indefinite"/>
+                      </p:stCondLst>
+                      <p:childTnLst>
+                        <p:par>
+                          <p:cTn id="8" fill="hold">
+                            <p:stCondLst>
+                              <p:cond delay="0"/>
+                            </p:stCondLst>
+                            <p:childTnLst>
+                              <p:par>
+                                <p:cTn id="9" presetID="1" presetClass="entr" presetSubtype="0" fill="hold" nodeType="clickEffect">
+                                  <p:stCondLst>
+                                    <p:cond delay="0"/>
+                                  </p:stCondLst>
+                                  <p:childTnLst>
+                                    <p:set>
+                                      <p:cBhvr>
+                                        <p:cTn id="10" dur="1" fill="hold">
+                                          <p:stCondLst>
+                                            <p:cond delay="0"/>
+                                          </p:stCondLst>
+                                        </p:cTn>
+                                        <p:tgtEl>
+                                          <p:spTgt spid="380"/>
+                                        </p:tgtEl>
+                                        <p:attrNameLst>
+                                          <p:attrName>style.visibility</p:attrName>
+                                        </p:attrNameLst>
+                                      </p:cBhvr>
+                                      <p:to>
+                                        <p:strVal val="visible"/>
+                                      </p:to>
+                                    </p:set>
+                                  </p:childTnLst>
+                                </p:cTn>
+                              </p:par>
+                            </p:childTnLst>
+                          </p:cTn>
+                        </p:par>
+                      </p:childTnLst>
+                    </p:cTn>
+                  </p:par>
+                </p:childTnLst>
+              </p:cTn>
+              <p:prevCondLst>
+                <p:cond evt="onPrev" delay="0">
+                  <p:tgtEl>
+                    <p:sldTgt/>
+                  </p:tgtEl>
+                </p:cond>
+              </p:prevCondLst>
+              <p:nextCondLst>
+                <p:cond evt="onNext" delay="0">
+                  <p:tgtEl>
+                    <p:sldTgt/>
+                  </p:tgtEl>
+                </p:cond>
+              </p:nextCondLst>
+            </p:seq>
+          </p:childTnLst>
+        </p:cTn>
+      </p:par>
+    </p:tnLst>
+  </p:timing>
+</p:sld>
+</file>
+
 <file path=ppt/slides/slide2.xml><?xml version="1.0" encoding="utf-8"?>
 <p:sld xmlns:a="http://schemas.openxmlformats.org/drawingml/2006/main" xmlns:r="http://schemas.openxmlformats.org/officeDocument/2006/relationships" xmlns:p="http://schemas.openxmlformats.org/presentationml/2006/main">
   <p:cSld>
@@ -31031,473 +31030,6 @@
   <p:cSld>
     <p:spTree>
       <p:nvGrpSpPr>
-        <p:cNvPr id="1" name="Shape 374"/>
-        <p:cNvGrpSpPr/>
-        <p:nvPr/>
-      </p:nvGrpSpPr>
-      <p:grpSpPr>
-        <a:xfrm>
-          <a:off x="0" y="0"/>
-          <a:ext cx="0" cy="0"/>
-          <a:chOff x="0" y="0"/>
-          <a:chExt cx="0" cy="0"/>
-        </a:xfrm>
-      </p:grpSpPr>
-      <p:sp>
-        <p:nvSpPr>
-          <p:cNvPr id="375" name="Google Shape;375;p21"/>
-          <p:cNvSpPr txBox="1">
-            <a:spLocks noGrp="1"/>
-          </p:cNvSpPr>
-          <p:nvPr>
-            <p:ph type="title"/>
-          </p:nvPr>
-        </p:nvSpPr>
-        <p:spPr>
-          <a:xfrm>
-            <a:off x="457200" y="228600"/>
-            <a:ext cx="8229600" cy="838200"/>
-          </a:xfrm>
-          <a:prstGeom prst="rect">
-            <a:avLst/>
-          </a:prstGeom>
-          <a:noFill/>
-          <a:ln>
-            <a:noFill/>
-          </a:ln>
-        </p:spPr>
-        <p:txBody>
-          <a:bodyPr spcFirstLastPara="1" wrap="square" lIns="91425" tIns="45700" rIns="91425" bIns="45700" anchor="t" anchorCtr="0">
-            <a:noAutofit/>
-          </a:bodyPr>
-          <a:lstStyle/>
-          <a:p>
-            <a:pPr marL="0" lvl="0" indent="0" algn="ctr" rtl="0">
-              <a:lnSpc>
-                <a:spcPct val="100000"/>
-              </a:lnSpc>
-              <a:spcBef>
-                <a:spcPts val="0"/>
-              </a:spcBef>
-              <a:spcAft>
-                <a:spcPts val="0"/>
-              </a:spcAft>
-              <a:buSzPts val="1400"/>
-              <a:buNone/>
-            </a:pPr>
-            <a:r>
-              <a:rPr lang="en-US"/>
-              <a:t>Isolating ErbB Signaling (BioModels 255)</a:t>
-            </a:r>
-            <a:endParaRPr/>
-          </a:p>
-        </p:txBody>
-      </p:sp>
-      <p:sp>
-        <p:nvSpPr>
-          <p:cNvPr id="376" name="Google Shape;376;p21"/>
-          <p:cNvSpPr txBox="1">
-            <a:spLocks noGrp="1"/>
-          </p:cNvSpPr>
-          <p:nvPr>
-            <p:ph type="sldNum" idx="12"/>
-          </p:nvPr>
-        </p:nvSpPr>
-        <p:spPr>
-          <a:xfrm>
-            <a:off x="7565366" y="6324600"/>
-            <a:ext cx="511834" cy="365125"/>
-          </a:xfrm>
-          <a:prstGeom prst="rect">
-            <a:avLst/>
-          </a:prstGeom>
-          <a:noFill/>
-          <a:ln>
-            <a:noFill/>
-          </a:ln>
-        </p:spPr>
-        <p:txBody>
-          <a:bodyPr spcFirstLastPara="1" wrap="square" lIns="91425" tIns="45700" rIns="91425" bIns="45700" anchor="t" anchorCtr="0">
-            <a:noAutofit/>
-          </a:bodyPr>
-          <a:lstStyle/>
-          <a:p>
-            <a:pPr marL="0" lvl="0" indent="0" algn="l" rtl="0">
-              <a:lnSpc>
-                <a:spcPct val="100000"/>
-              </a:lnSpc>
-              <a:spcBef>
-                <a:spcPts val="0"/>
-              </a:spcBef>
-              <a:spcAft>
-                <a:spcPts val="0"/>
-              </a:spcAft>
-              <a:buSzPts val="1800"/>
-              <a:buNone/>
-            </a:pPr>
-            <a:fld id="{00000000-1234-1234-1234-123412341234}" type="slidenum">
-              <a:rPr lang="en-US"/>
-              <a:t>20</a:t>
-            </a:fld>
-            <a:endParaRPr/>
-          </a:p>
-        </p:txBody>
-      </p:sp>
-      <p:pic>
-        <p:nvPicPr>
-          <p:cNvPr id="377" name="Google Shape;377;p21" descr="A picture containing text&#10;&#10;Description automatically generated"/>
-          <p:cNvPicPr preferRelativeResize="0"/>
-          <p:nvPr/>
-        </p:nvPicPr>
-        <p:blipFill rotWithShape="1">
-          <a:blip r:embed="rId3">
-            <a:alphaModFix/>
-          </a:blip>
-          <a:srcRect/>
-          <a:stretch/>
-        </p:blipFill>
-        <p:spPr>
-          <a:xfrm>
-            <a:off x="970026" y="1669011"/>
-            <a:ext cx="6677384" cy="4459895"/>
-          </a:xfrm>
-          <a:prstGeom prst="rect">
-            <a:avLst/>
-          </a:prstGeom>
-          <a:noFill/>
-          <a:ln>
-            <a:noFill/>
-          </a:ln>
-        </p:spPr>
-      </p:pic>
-      <p:sp>
-        <p:nvSpPr>
-          <p:cNvPr id="378" name="Google Shape;378;p21"/>
-          <p:cNvSpPr txBox="1"/>
-          <p:nvPr/>
-        </p:nvSpPr>
-        <p:spPr>
-          <a:xfrm>
-            <a:off x="970026" y="1103985"/>
-            <a:ext cx="5596404" cy="369332"/>
-          </a:xfrm>
-          <a:prstGeom prst="rect">
-            <a:avLst/>
-          </a:prstGeom>
-          <a:noFill/>
-          <a:ln>
-            <a:noFill/>
-          </a:ln>
-        </p:spPr>
-        <p:txBody>
-          <a:bodyPr spcFirstLastPara="1" wrap="square" lIns="91425" tIns="45700" rIns="91425" bIns="45700" anchor="t" anchorCtr="0">
-            <a:spAutoFit/>
-          </a:bodyPr>
-          <a:lstStyle/>
-          <a:p>
-            <a:pPr marL="0" marR="0" lvl="0" indent="0" algn="l" rtl="0">
-              <a:lnSpc>
-                <a:spcPct val="100000"/>
-              </a:lnSpc>
-              <a:spcBef>
-                <a:spcPts val="0"/>
-              </a:spcBef>
-              <a:spcAft>
-                <a:spcPts val="0"/>
-              </a:spcAft>
-              <a:buClr>
-                <a:srgbClr val="000000"/>
-              </a:buClr>
-              <a:buSzPts val="1800"/>
-              <a:buFont typeface="Arial"/>
-              <a:buNone/>
-            </a:pPr>
-            <a:r>
-              <a:rPr lang="en-US" sz="1800" b="0" i="0" u="none" strike="noStrike" cap="none">
-                <a:solidFill>
-                  <a:schemeClr val="dk1"/>
-                </a:solidFill>
-                <a:latin typeface="Arial"/>
-                <a:ea typeface="Arial"/>
-                <a:cs typeface="Arial"/>
-                <a:sym typeface="Arial"/>
-              </a:rPr>
-              <a:t>Is there a stoichiometric inconsistency here? Where?</a:t>
-            </a:r>
-            <a:endParaRPr sz="1400" b="0" i="0" u="none" strike="noStrike" cap="none">
-              <a:solidFill>
-                <a:srgbClr val="000000"/>
-              </a:solidFill>
-              <a:latin typeface="Arial"/>
-              <a:ea typeface="Arial"/>
-              <a:cs typeface="Arial"/>
-              <a:sym typeface="Arial"/>
-            </a:endParaRPr>
-          </a:p>
-        </p:txBody>
-      </p:sp>
-      <p:sp>
-        <p:nvSpPr>
-          <p:cNvPr id="379" name="Google Shape;379;p21"/>
-          <p:cNvSpPr/>
-          <p:nvPr/>
-        </p:nvSpPr>
-        <p:spPr>
-          <a:xfrm>
-            <a:off x="1077457" y="4014225"/>
-            <a:ext cx="7181088" cy="2218944"/>
-          </a:xfrm>
-          <a:prstGeom prst="rect">
-            <a:avLst/>
-          </a:prstGeom>
-          <a:solidFill>
-            <a:schemeClr val="lt1"/>
-          </a:solidFill>
-          <a:ln>
-            <a:noFill/>
-          </a:ln>
-          <a:effectLst>
-            <a:outerShdw dist="23000" sx="1000" sy="1000" rotWithShape="0">
-              <a:srgbClr val="000000"/>
-            </a:outerShdw>
-          </a:effectLst>
-        </p:spPr>
-        <p:txBody>
-          <a:bodyPr spcFirstLastPara="1" wrap="square" lIns="91425" tIns="45700" rIns="91425" bIns="45700" anchor="ctr" anchorCtr="0">
-            <a:noAutofit/>
-          </a:bodyPr>
-          <a:lstStyle/>
-          <a:p>
-            <a:pPr marL="0" marR="0" lvl="0" indent="0" algn="ctr" rtl="0">
-              <a:lnSpc>
-                <a:spcPct val="100000"/>
-              </a:lnSpc>
-              <a:spcBef>
-                <a:spcPts val="0"/>
-              </a:spcBef>
-              <a:spcAft>
-                <a:spcPts val="0"/>
-              </a:spcAft>
-              <a:buClr>
-                <a:srgbClr val="000000"/>
-              </a:buClr>
-              <a:buSzPts val="1800"/>
-              <a:buFont typeface="Arial"/>
-              <a:buNone/>
-            </a:pPr>
-            <a:endParaRPr sz="1800" b="0" i="0" u="none" strike="noStrike" cap="none">
-              <a:solidFill>
-                <a:schemeClr val="lt1"/>
-              </a:solidFill>
-              <a:latin typeface="Arial"/>
-              <a:ea typeface="Arial"/>
-              <a:cs typeface="Arial"/>
-              <a:sym typeface="Arial"/>
-            </a:endParaRPr>
-          </a:p>
-        </p:txBody>
-      </p:sp>
-      <p:sp>
-        <p:nvSpPr>
-          <p:cNvPr id="380" name="Google Shape;380;p21"/>
-          <p:cNvSpPr txBox="1"/>
-          <p:nvPr/>
-        </p:nvSpPr>
-        <p:spPr>
-          <a:xfrm>
-            <a:off x="5358384" y="2027889"/>
-            <a:ext cx="3511296" cy="646331"/>
-          </a:xfrm>
-          <a:prstGeom prst="rect">
-            <a:avLst/>
-          </a:prstGeom>
-          <a:solidFill>
-            <a:srgbClr val="F2F2F2"/>
-          </a:solidFill>
-          <a:ln>
-            <a:noFill/>
-          </a:ln>
-        </p:spPr>
-        <p:txBody>
-          <a:bodyPr spcFirstLastPara="1" wrap="square" lIns="91425" tIns="45700" rIns="91425" bIns="45700" anchor="t" anchorCtr="0">
-            <a:spAutoFit/>
-          </a:bodyPr>
-          <a:lstStyle/>
-          <a:p>
-            <a:pPr marL="0" marR="0" lvl="0" indent="0" algn="l" rtl="0">
-              <a:lnSpc>
-                <a:spcPct val="100000"/>
-              </a:lnSpc>
-              <a:spcBef>
-                <a:spcPts val="0"/>
-              </a:spcBef>
-              <a:spcAft>
-                <a:spcPts val="0"/>
-              </a:spcAft>
-              <a:buClr>
-                <a:srgbClr val="000000"/>
-              </a:buClr>
-              <a:buSzPts val="1800"/>
-              <a:buFont typeface="Arial"/>
-              <a:buNone/>
-            </a:pPr>
-            <a:r>
-              <a:rPr lang="en-US" sz="1800" b="1" i="0" u="none" strike="noStrike" cap="none">
-                <a:solidFill>
-                  <a:schemeClr val="dk1"/>
-                </a:solidFill>
-                <a:latin typeface="Arial"/>
-                <a:ea typeface="Arial"/>
-                <a:cs typeface="Arial"/>
-                <a:sym typeface="Arial"/>
-              </a:rPr>
-              <a:t>Isolating errors is required to remediate complex errors.</a:t>
-            </a:r>
-            <a:endParaRPr sz="1400" b="0" i="0" u="none" strike="noStrike" cap="none">
-              <a:solidFill>
-                <a:srgbClr val="000000"/>
-              </a:solidFill>
-              <a:latin typeface="Arial"/>
-              <a:ea typeface="Arial"/>
-              <a:cs typeface="Arial"/>
-              <a:sym typeface="Arial"/>
-            </a:endParaRPr>
-          </a:p>
-        </p:txBody>
-      </p:sp>
-    </p:spTree>
-  </p:cSld>
-  <p:clrMapOvr>
-    <a:masterClrMapping/>
-  </p:clrMapOvr>
-  <p:timing>
-    <p:tnLst>
-      <p:par>
-        <p:cTn id="1" dur="indefinite" restart="never" nodeType="tmRoot">
-          <p:childTnLst>
-            <p:seq concurrent="1" nextAc="seek">
-              <p:cTn id="2" dur="indefinite" nodeType="mainSeq">
-                <p:childTnLst>
-                  <p:par>
-                    <p:cTn id="3" fill="hold">
-                      <p:stCondLst>
-                        <p:cond delay="indefinite"/>
-                      </p:stCondLst>
-                      <p:childTnLst>
-                        <p:par>
-                          <p:cTn id="4" fill="hold">
-                            <p:stCondLst>
-                              <p:cond delay="0"/>
-                            </p:stCondLst>
-                            <p:childTnLst>
-                              <p:par>
-                                <p:cTn id="5" presetID="1" presetClass="exit" presetSubtype="0" fill="hold" nodeType="clickEffect">
-                                  <p:stCondLst>
-                                    <p:cond delay="0"/>
-                                  </p:stCondLst>
-                                  <p:childTnLst>
-                                    <p:set>
-                                      <p:cBhvr>
-                                        <p:cTn id="6" dur="1" fill="hold">
-                                          <p:stCondLst>
-                                            <p:cond delay="1"/>
-                                          </p:stCondLst>
-                                        </p:cTn>
-                                        <p:tgtEl>
-                                          <p:spTgt spid="379"/>
-                                        </p:tgtEl>
-                                        <p:attrNameLst>
-                                          <p:attrName>style.visibility</p:attrName>
-                                        </p:attrNameLst>
-                                      </p:cBhvr>
-                                      <p:to>
-                                        <p:strVal val="hidden"/>
-                                      </p:to>
-                                    </p:set>
-                                  </p:childTnLst>
-                                </p:cTn>
-                              </p:par>
-                            </p:childTnLst>
-                          </p:cTn>
-                        </p:par>
-                      </p:childTnLst>
-                    </p:cTn>
-                  </p:par>
-                  <p:par>
-                    <p:cTn id="7" fill="hold">
-                      <p:stCondLst>
-                        <p:cond delay="indefinite"/>
-                      </p:stCondLst>
-                      <p:childTnLst>
-                        <p:par>
-                          <p:cTn id="8" fill="hold">
-                            <p:stCondLst>
-                              <p:cond delay="0"/>
-                            </p:stCondLst>
-                            <p:childTnLst>
-                              <p:par>
-                                <p:cTn id="9" presetID="1" presetClass="entr" presetSubtype="0" fill="hold" nodeType="clickEffect">
-                                  <p:stCondLst>
-                                    <p:cond delay="0"/>
-                                  </p:stCondLst>
-                                  <p:childTnLst>
-                                    <p:set>
-                                      <p:cBhvr>
-                                        <p:cTn id="10" dur="1" fill="hold">
-                                          <p:stCondLst>
-                                            <p:cond delay="0"/>
-                                          </p:stCondLst>
-                                        </p:cTn>
-                                        <p:tgtEl>
-                                          <p:spTgt spid="380"/>
-                                        </p:tgtEl>
-                                        <p:attrNameLst>
-                                          <p:attrName>style.visibility</p:attrName>
-                                        </p:attrNameLst>
-                                      </p:cBhvr>
-                                      <p:to>
-                                        <p:strVal val="visible"/>
-                                      </p:to>
-                                    </p:set>
-                                  </p:childTnLst>
-                                </p:cTn>
-                              </p:par>
-                            </p:childTnLst>
-                          </p:cTn>
-                        </p:par>
-                      </p:childTnLst>
-                    </p:cTn>
-                  </p:par>
-                </p:childTnLst>
-              </p:cTn>
-              <p:prevCondLst>
-                <p:cond evt="onPrev" delay="0">
-                  <p:tgtEl>
-                    <p:sldTgt/>
-                  </p:tgtEl>
-                </p:cond>
-              </p:prevCondLst>
-              <p:nextCondLst>
-                <p:cond evt="onNext" delay="0">
-                  <p:tgtEl>
-                    <p:sldTgt/>
-                  </p:tgtEl>
-                </p:cond>
-              </p:nextCondLst>
-            </p:seq>
-          </p:childTnLst>
-        </p:cTn>
-      </p:par>
-    </p:tnLst>
-  </p:timing>
-</p:sld>
-</file>
-
-<file path=ppt/slides/slide21.xml><?xml version="1.0" encoding="utf-8"?>
-<p:sld xmlns:a="http://schemas.openxmlformats.org/drawingml/2006/main" xmlns:r="http://schemas.openxmlformats.org/officeDocument/2006/relationships" xmlns:p="http://schemas.openxmlformats.org/presentationml/2006/main">
-  <p:cSld>
-    <p:spTree>
-      <p:nvGrpSpPr>
         <p:cNvPr id="1" name="Shape 384"/>
         <p:cNvGrpSpPr/>
         <p:nvPr/>
@@ -31604,7 +31136,7 @@
             </a:pPr>
             <a:fld id="{00000000-1234-1234-1234-123412341234}" type="slidenum">
               <a:rPr lang="en-US"/>
-              <a:t>21</a:t>
+              <a:t>20</a:t>
             </a:fld>
             <a:endParaRPr/>
           </a:p>
@@ -32689,7 +32221,7 @@
 </p:sld>
 </file>
 
-<file path=ppt/slides/slide22.xml><?xml version="1.0" encoding="utf-8"?>
+<file path=ppt/slides/slide21.xml><?xml version="1.0" encoding="utf-8"?>
 <p:sld xmlns:a="http://schemas.openxmlformats.org/drawingml/2006/main" xmlns:r="http://schemas.openxmlformats.org/officeDocument/2006/relationships" xmlns:p="http://schemas.openxmlformats.org/presentationml/2006/main">
   <p:cSld>
     <p:spTree>
@@ -32903,7 +32435,7 @@
             </a:pPr>
             <a:fld id="{00000000-1234-1234-1234-123412341234}" type="slidenum">
               <a:rPr lang="en-US"/>
-              <a:t>22</a:t>
+              <a:t>21</a:t>
             </a:fld>
             <a:endParaRPr/>
           </a:p>
@@ -33270,7 +32802,7 @@
 </p:sld>
 </file>
 
-<file path=ppt/slides/slide23.xml><?xml version="1.0" encoding="utf-8"?>
+<file path=ppt/slides/slide22.xml><?xml version="1.0" encoding="utf-8"?>
 <p:sld xmlns:a="http://schemas.openxmlformats.org/drawingml/2006/main" xmlns:r="http://schemas.openxmlformats.org/officeDocument/2006/relationships" xmlns:p="http://schemas.openxmlformats.org/presentationml/2006/main">
   <p:cSld>
     <p:spTree>
@@ -33381,7 +32913,7 @@
             </a:pPr>
             <a:fld id="{00000000-1234-1234-1234-123412341234}" type="slidenum">
               <a:rPr lang="en-US"/>
-              <a:t>23</a:t>
+              <a:t>22</a:t>
             </a:fld>
             <a:endParaRPr/>
           </a:p>
@@ -33488,12 +33020,12 @@
 </p:sld>
 </file>
 
-<file path=ppt/slides/slide3.xml><?xml version="1.0" encoding="utf-8"?>
+<file path=ppt/slides/slide23.xml><?xml version="1.0" encoding="utf-8"?>
 <p:sld xmlns:a="http://schemas.openxmlformats.org/drawingml/2006/main" xmlns:r="http://schemas.openxmlformats.org/officeDocument/2006/relationships" xmlns:p="http://schemas.openxmlformats.org/presentationml/2006/main">
   <p:cSld>
     <p:spTree>
       <p:nvGrpSpPr>
-        <p:cNvPr id="1" name="Shape 121"/>
+        <p:cNvPr id="1" name=""/>
         <p:cNvGrpSpPr/>
         <p:nvPr/>
       </p:nvGrpSpPr>
@@ -33507,848 +33039,175 @@
       </p:grpSpPr>
       <p:sp>
         <p:nvSpPr>
-          <p:cNvPr id="122" name="Google Shape;122;p3"/>
-          <p:cNvSpPr txBox="1">
+          <p:cNvPr id="2" name="Title 1">
+            <a:extLst>
+              <a:ext uri="{FF2B5EF4-FFF2-40B4-BE49-F238E27FC236}">
+                <a16:creationId xmlns:a16="http://schemas.microsoft.com/office/drawing/2014/main" id="{F6929AA0-1ABC-7079-BAF8-74AD5E287774}"/>
+              </a:ext>
+            </a:extLst>
+          </p:cNvPr>
+          <p:cNvSpPr>
             <a:spLocks noGrp="1"/>
           </p:cNvSpPr>
           <p:nvPr>
             <p:ph type="title"/>
           </p:nvPr>
         </p:nvSpPr>
-        <p:spPr>
-          <a:xfrm>
-            <a:off x="457200" y="381000"/>
-            <a:ext cx="8229600" cy="838200"/>
-          </a:xfrm>
-          <a:prstGeom prst="rect">
-            <a:avLst/>
-          </a:prstGeom>
-          <a:noFill/>
-          <a:ln>
-            <a:noFill/>
-          </a:ln>
-        </p:spPr>
+        <p:spPr/>
         <p:txBody>
-          <a:bodyPr spcFirstLastPara="1" wrap="square" lIns="91425" tIns="45700" rIns="91425" bIns="45700" anchor="t" anchorCtr="0">
-            <a:noAutofit/>
-          </a:bodyPr>
+          <a:bodyPr/>
           <a:lstStyle/>
           <a:p>
-            <a:pPr marL="0" lvl="0" indent="0" algn="ctr" rtl="0">
-              <a:lnSpc>
-                <a:spcPct val="100000"/>
-              </a:lnSpc>
-              <a:spcBef>
-                <a:spcPts val="0"/>
-              </a:spcBef>
-              <a:spcAft>
-                <a:spcPts val="0"/>
-              </a:spcAft>
-              <a:buSzPts val="1400"/>
-              <a:buNone/>
-            </a:pPr>
             <a:r>
-              <a:rPr lang="en-US"/>
-              <a:t>Testing a Software Package (</a:t>
+              <a:rPr lang="en-US" dirty="0"/>
+              <a:t>Source Editor for Antimony Models:</a:t>
             </a:r>
+            <a:br>
+              <a:rPr lang="en-US" dirty="0"/>
+            </a:br>
             <a:r>
-              <a:rPr lang="en-US">
-                <a:latin typeface="Courier New"/>
-                <a:ea typeface="Courier New"/>
-                <a:cs typeface="Courier New"/>
-                <a:sym typeface="Courier New"/>
+              <a:rPr lang="en-US" dirty="0">
+                <a:hlinkClick r:id="rId2"/>
               </a:rPr>
-              <a:t>SBstoat</a:t>
+              <a:t>Antimony Web Editor (AWE)</a:t>
             </a:r>
-            <a:r>
-              <a:rPr lang="en-US"/>
-              <a:t>)</a:t>
-            </a:r>
-            <a:endParaRPr/>
+            <a:endParaRPr lang="en-US" dirty="0"/>
           </a:p>
         </p:txBody>
       </p:sp>
       <p:sp>
         <p:nvSpPr>
-          <p:cNvPr id="123" name="Google Shape;123;p3"/>
-          <p:cNvSpPr txBox="1">
+          <p:cNvPr id="3" name="Slide Number Placeholder 2">
+            <a:extLst>
+              <a:ext uri="{FF2B5EF4-FFF2-40B4-BE49-F238E27FC236}">
+                <a16:creationId xmlns:a16="http://schemas.microsoft.com/office/drawing/2014/main" id="{D099FF03-804F-ABA4-6146-B390F7A8261C}"/>
+              </a:ext>
+            </a:extLst>
+          </p:cNvPr>
+          <p:cNvSpPr>
             <a:spLocks noGrp="1"/>
           </p:cNvSpPr>
           <p:nvPr>
             <p:ph type="sldNum" idx="12"/>
           </p:nvPr>
         </p:nvSpPr>
+        <p:spPr/>
+        <p:txBody>
+          <a:bodyPr/>
+          <a:lstStyle/>
+          <a:p>
+            <a:pPr marL="0" lvl="0" indent="0" algn="l" rtl="0">
+              <a:spcBef>
+                <a:spcPts val="0"/>
+              </a:spcBef>
+              <a:spcAft>
+                <a:spcPts val="0"/>
+              </a:spcAft>
+              <a:buNone/>
+            </a:pPr>
+            <a:fld id="{00000000-1234-1234-1234-123412341234}" type="slidenum">
+              <a:rPr lang="en-US" smtClean="0"/>
+              <a:t>23</a:t>
+            </a:fld>
+            <a:endParaRPr lang="en-US"/>
+          </a:p>
+        </p:txBody>
+      </p:sp>
+      <p:pic>
+        <p:nvPicPr>
+          <p:cNvPr id="5" name="Picture 4">
+            <a:extLst>
+              <a:ext uri="{FF2B5EF4-FFF2-40B4-BE49-F238E27FC236}">
+                <a16:creationId xmlns:a16="http://schemas.microsoft.com/office/drawing/2014/main" id="{167E3567-762E-F2F6-F7CC-3DE091740AF1}"/>
+              </a:ext>
+            </a:extLst>
+          </p:cNvPr>
+          <p:cNvPicPr>
+            <a:picLocks noChangeAspect="1"/>
+          </p:cNvPicPr>
+          <p:nvPr/>
+        </p:nvPicPr>
+        <p:blipFill>
+          <a:blip r:embed="rId3"/>
+          <a:stretch>
+            <a:fillRect/>
+          </a:stretch>
+        </p:blipFill>
         <p:spPr>
           <a:xfrm>
-            <a:off x="7543801" y="5486400"/>
-            <a:ext cx="533400" cy="365100"/>
+            <a:off x="961696" y="1306755"/>
+            <a:ext cx="7391400" cy="4777890"/>
+          </a:xfrm>
+          <a:prstGeom prst="rect">
+            <a:avLst/>
+          </a:prstGeom>
+        </p:spPr>
+      </p:pic>
+      <p:sp>
+        <p:nvSpPr>
+          <p:cNvPr id="7" name="TextBox 6">
+            <a:extLst>
+              <a:ext uri="{FF2B5EF4-FFF2-40B4-BE49-F238E27FC236}">
+                <a16:creationId xmlns:a16="http://schemas.microsoft.com/office/drawing/2014/main" id="{8E349D90-FEEE-54B9-5BD8-7C1B14F01568}"/>
+              </a:ext>
+            </a:extLst>
+          </p:cNvPr>
+          <p:cNvSpPr txBox="1"/>
+          <p:nvPr/>
+        </p:nvSpPr>
+        <p:spPr>
+          <a:xfrm>
+            <a:off x="1392621" y="6199385"/>
+            <a:ext cx="4572000" cy="307777"/>
           </a:xfrm>
           <a:prstGeom prst="rect">
             <a:avLst/>
           </a:prstGeom>
           <a:noFill/>
-          <a:ln>
-            <a:noFill/>
-          </a:ln>
         </p:spPr>
         <p:txBody>
-          <a:bodyPr spcFirstLastPara="1" wrap="square" lIns="91425" tIns="45700" rIns="91425" bIns="45700" anchor="t" anchorCtr="0">
-            <a:noAutofit/>
-          </a:bodyPr>
-          <a:lstStyle/>
-          <a:p>
-            <a:pPr marL="0" lvl="0" indent="0" algn="l" rtl="0">
-              <a:lnSpc>
-                <a:spcPct val="100000"/>
-              </a:lnSpc>
-              <a:spcBef>
-                <a:spcPts val="0"/>
-              </a:spcBef>
-              <a:spcAft>
-                <a:spcPts val="0"/>
-              </a:spcAft>
-              <a:buSzPts val="1800"/>
-              <a:buNone/>
-            </a:pPr>
-            <a:fld id="{00000000-1234-1234-1234-123412341234}" type="slidenum">
-              <a:rPr lang="en-US"/>
-              <a:t>3</a:t>
-            </a:fld>
-            <a:endParaRPr/>
-          </a:p>
-        </p:txBody>
-      </p:sp>
-      <p:graphicFrame>
-        <p:nvGraphicFramePr>
-          <p:cNvPr id="124" name="Google Shape;124;p3"/>
-          <p:cNvGraphicFramePr/>
-          <p:nvPr/>
-        </p:nvGraphicFramePr>
-        <p:xfrm>
-          <a:off x="457200" y="997216"/>
-          <a:ext cx="5212075" cy="1483400"/>
-        </p:xfrm>
-        <a:graphic>
-          <a:graphicData uri="http://schemas.openxmlformats.org/drawingml/2006/table">
-            <a:tbl>
-              <a:tblPr firstRow="1" bandRow="1">
-                <a:noFill/>
-                <a:tableStyleId>{BF9ABD45-647E-4655-B68F-2913BAC25D6C}</a:tableStyleId>
-              </a:tblPr>
-              <a:tblGrid>
-                <a:gridCol w="1637550">
-                  <a:extLst>
-                    <a:ext uri="{9D8B030D-6E8A-4147-A177-3AD203B41FA5}">
-                      <a16:colId xmlns:a16="http://schemas.microsoft.com/office/drawing/2014/main" val="20000"/>
-                    </a:ext>
-                  </a:extLst>
-                </a:gridCol>
-                <a:gridCol w="2102350">
-                  <a:extLst>
-                    <a:ext uri="{9D8B030D-6E8A-4147-A177-3AD203B41FA5}">
-                      <a16:colId xmlns:a16="http://schemas.microsoft.com/office/drawing/2014/main" val="20001"/>
-                    </a:ext>
-                  </a:extLst>
-                </a:gridCol>
-                <a:gridCol w="1472175">
-                  <a:extLst>
-                    <a:ext uri="{9D8B030D-6E8A-4147-A177-3AD203B41FA5}">
-                      <a16:colId xmlns:a16="http://schemas.microsoft.com/office/drawing/2014/main" val="20002"/>
-                    </a:ext>
-                  </a:extLst>
-                </a:gridCol>
-              </a:tblGrid>
-              <a:tr h="370850">
-                <a:tc>
-                  <a:txBody>
-                    <a:bodyPr/>
-                    <a:lstStyle/>
-                    <a:p>
-                      <a:pPr marL="0" marR="0" lvl="0" indent="0" algn="ctr" rtl="0">
-                        <a:lnSpc>
-                          <a:spcPct val="100000"/>
-                        </a:lnSpc>
-                        <a:spcBef>
-                          <a:spcPts val="0"/>
-                        </a:spcBef>
-                        <a:spcAft>
-                          <a:spcPts val="0"/>
-                        </a:spcAft>
-                        <a:buClr>
-                          <a:srgbClr val="000000"/>
-                        </a:buClr>
-                        <a:buSzPts val="1800"/>
-                        <a:buFont typeface="Arial"/>
-                        <a:buNone/>
-                      </a:pPr>
-                      <a:endParaRPr sz="1800" u="none" strike="noStrike" cap="none"/>
-                    </a:p>
-                  </a:txBody>
-                  <a:tcPr marL="91450" marR="91450" marT="45725" marB="45725"/>
-                </a:tc>
-                <a:tc>
-                  <a:txBody>
-                    <a:bodyPr/>
-                    <a:lstStyle/>
-                    <a:p>
-                      <a:pPr marL="0" marR="0" lvl="0" indent="0" algn="ctr" rtl="0">
-                        <a:lnSpc>
-                          <a:spcPct val="100000"/>
-                        </a:lnSpc>
-                        <a:spcBef>
-                          <a:spcPts val="0"/>
-                        </a:spcBef>
-                        <a:spcAft>
-                          <a:spcPts val="0"/>
-                        </a:spcAft>
-                        <a:buClr>
-                          <a:srgbClr val="000000"/>
-                        </a:buClr>
-                        <a:buSzPts val="1800"/>
-                        <a:buFont typeface="Arial"/>
-                        <a:buNone/>
-                      </a:pPr>
-                      <a:r>
-                        <a:rPr lang="en-US" sz="1800" u="none" strike="noStrike" cap="none"/>
-                        <a:t>No. Modules (Files)</a:t>
-                      </a:r>
-                      <a:endParaRPr sz="1400" u="none" strike="noStrike" cap="none"/>
-                    </a:p>
-                  </a:txBody>
-                  <a:tcPr marL="91450" marR="91450" marT="45725" marB="45725"/>
-                </a:tc>
-                <a:tc>
-                  <a:txBody>
-                    <a:bodyPr/>
-                    <a:lstStyle/>
-                    <a:p>
-                      <a:pPr marL="0" marR="0" lvl="0" indent="0" algn="ctr" rtl="0">
-                        <a:lnSpc>
-                          <a:spcPct val="100000"/>
-                        </a:lnSpc>
-                        <a:spcBef>
-                          <a:spcPts val="0"/>
-                        </a:spcBef>
-                        <a:spcAft>
-                          <a:spcPts val="0"/>
-                        </a:spcAft>
-                        <a:buClr>
-                          <a:srgbClr val="000000"/>
-                        </a:buClr>
-                        <a:buSzPts val="1800"/>
-                        <a:buFont typeface="Arial"/>
-                        <a:buNone/>
-                      </a:pPr>
-                      <a:r>
-                        <a:rPr lang="en-US" sz="1800" u="none" strike="noStrike" cap="none"/>
-                        <a:t>Lines of Code</a:t>
-                      </a:r>
-                      <a:endParaRPr sz="1400" u="none" strike="noStrike" cap="none"/>
-                    </a:p>
-                  </a:txBody>
-                  <a:tcPr marL="91450" marR="91450" marT="45725" marB="45725"/>
-                </a:tc>
-                <a:extLst>
-                  <a:ext uri="{0D108BD9-81ED-4DB2-BD59-A6C34878D82A}">
-                    <a16:rowId xmlns:a16="http://schemas.microsoft.com/office/drawing/2014/main" val="10000"/>
-                  </a:ext>
-                </a:extLst>
-              </a:tr>
-              <a:tr h="370850">
-                <a:tc>
-                  <a:txBody>
-                    <a:bodyPr/>
-                    <a:lstStyle/>
-                    <a:p>
-                      <a:pPr marL="0" marR="0" lvl="0" indent="0" algn="l" rtl="0">
-                        <a:lnSpc>
-                          <a:spcPct val="100000"/>
-                        </a:lnSpc>
-                        <a:spcBef>
-                          <a:spcPts val="0"/>
-                        </a:spcBef>
-                        <a:spcAft>
-                          <a:spcPts val="0"/>
-                        </a:spcAft>
-                        <a:buClr>
-                          <a:srgbClr val="000000"/>
-                        </a:buClr>
-                        <a:buSzPts val="1800"/>
-                        <a:buFont typeface="Arial"/>
-                        <a:buNone/>
-                      </a:pPr>
-                      <a:r>
-                        <a:rPr lang="en-US" sz="1800" u="none" strike="noStrike" cap="none"/>
-                        <a:t>Package codes</a:t>
-                      </a:r>
-                      <a:endParaRPr sz="1400" u="none" strike="noStrike" cap="none"/>
-                    </a:p>
-                  </a:txBody>
-                  <a:tcPr marL="91450" marR="91450" marT="45725" marB="45725"/>
-                </a:tc>
-                <a:tc>
-                  <a:txBody>
-                    <a:bodyPr/>
-                    <a:lstStyle/>
-                    <a:p>
-                      <a:pPr marL="0" marR="0" lvl="0" indent="0" algn="r" rtl="0">
-                        <a:lnSpc>
-                          <a:spcPct val="100000"/>
-                        </a:lnSpc>
-                        <a:spcBef>
-                          <a:spcPts val="0"/>
-                        </a:spcBef>
-                        <a:spcAft>
-                          <a:spcPts val="0"/>
-                        </a:spcAft>
-                        <a:buClr>
-                          <a:srgbClr val="000000"/>
-                        </a:buClr>
-                        <a:buSzPts val="1800"/>
-                        <a:buFont typeface="Arial"/>
-                        <a:buNone/>
-                      </a:pPr>
-                      <a:r>
-                        <a:rPr lang="en-US" sz="1800" u="none" strike="noStrike" cap="none"/>
-                        <a:t>26</a:t>
-                      </a:r>
-                      <a:endParaRPr sz="1400" u="none" strike="noStrike" cap="none"/>
-                    </a:p>
-                  </a:txBody>
-                  <a:tcPr marL="91450" marR="91450" marT="45725" marB="45725"/>
-                </a:tc>
-                <a:tc>
-                  <a:txBody>
-                    <a:bodyPr/>
-                    <a:lstStyle/>
-                    <a:p>
-                      <a:pPr marL="0" marR="0" lvl="0" indent="0" algn="r" rtl="0">
-                        <a:lnSpc>
-                          <a:spcPct val="100000"/>
-                        </a:lnSpc>
-                        <a:spcBef>
-                          <a:spcPts val="0"/>
-                        </a:spcBef>
-                        <a:spcAft>
-                          <a:spcPts val="0"/>
-                        </a:spcAft>
-                        <a:buClr>
-                          <a:srgbClr val="000000"/>
-                        </a:buClr>
-                        <a:buSzPts val="1800"/>
-                        <a:buFont typeface="Arial"/>
-                        <a:buNone/>
-                      </a:pPr>
-                      <a:r>
-                        <a:rPr lang="en-US" sz="1800" u="none" strike="noStrike" cap="none"/>
-                        <a:t>~6,000</a:t>
-                      </a:r>
-                      <a:endParaRPr sz="1400" u="none" strike="noStrike" cap="none"/>
-                    </a:p>
-                  </a:txBody>
-                  <a:tcPr marL="91450" marR="91450" marT="45725" marB="45725"/>
-                </a:tc>
-                <a:extLst>
-                  <a:ext uri="{0D108BD9-81ED-4DB2-BD59-A6C34878D82A}">
-                    <a16:rowId xmlns:a16="http://schemas.microsoft.com/office/drawing/2014/main" val="10001"/>
-                  </a:ext>
-                </a:extLst>
-              </a:tr>
-              <a:tr h="370850">
-                <a:tc>
-                  <a:txBody>
-                    <a:bodyPr/>
-                    <a:lstStyle/>
-                    <a:p>
-                      <a:pPr marL="0" marR="0" lvl="0" indent="0" algn="l" rtl="0">
-                        <a:lnSpc>
-                          <a:spcPct val="100000"/>
-                        </a:lnSpc>
-                        <a:spcBef>
-                          <a:spcPts val="0"/>
-                        </a:spcBef>
-                        <a:spcAft>
-                          <a:spcPts val="0"/>
-                        </a:spcAft>
-                        <a:buClr>
-                          <a:srgbClr val="000000"/>
-                        </a:buClr>
-                        <a:buSzPts val="1800"/>
-                        <a:buFont typeface="Arial"/>
-                        <a:buNone/>
-                      </a:pPr>
-                      <a:r>
-                        <a:rPr lang="en-US" sz="1800" u="none" strike="noStrike" cap="none"/>
-                        <a:t>Test codes</a:t>
-                      </a:r>
-                      <a:endParaRPr sz="1400" u="none" strike="noStrike" cap="none"/>
-                    </a:p>
-                  </a:txBody>
-                  <a:tcPr marL="91450" marR="91450" marT="45725" marB="45725"/>
-                </a:tc>
-                <a:tc>
-                  <a:txBody>
-                    <a:bodyPr/>
-                    <a:lstStyle/>
-                    <a:p>
-                      <a:pPr marL="0" marR="0" lvl="0" indent="0" algn="r" rtl="0">
-                        <a:lnSpc>
-                          <a:spcPct val="100000"/>
-                        </a:lnSpc>
-                        <a:spcBef>
-                          <a:spcPts val="0"/>
-                        </a:spcBef>
-                        <a:spcAft>
-                          <a:spcPts val="0"/>
-                        </a:spcAft>
-                        <a:buClr>
-                          <a:srgbClr val="000000"/>
-                        </a:buClr>
-                        <a:buSzPts val="1800"/>
-                        <a:buFont typeface="Arial"/>
-                        <a:buNone/>
-                      </a:pPr>
-                      <a:r>
-                        <a:rPr lang="en-US" sz="1800" u="none" strike="noStrike" cap="none"/>
-                        <a:t>33</a:t>
-                      </a:r>
-                      <a:endParaRPr sz="1400" u="none" strike="noStrike" cap="none"/>
-                    </a:p>
-                  </a:txBody>
-                  <a:tcPr marL="91450" marR="91450" marT="45725" marB="45725"/>
-                </a:tc>
-                <a:tc>
-                  <a:txBody>
-                    <a:bodyPr/>
-                    <a:lstStyle/>
-                    <a:p>
-                      <a:pPr marL="0" marR="0" lvl="0" indent="0" algn="r" rtl="0">
-                        <a:lnSpc>
-                          <a:spcPct val="100000"/>
-                        </a:lnSpc>
-                        <a:spcBef>
-                          <a:spcPts val="0"/>
-                        </a:spcBef>
-                        <a:spcAft>
-                          <a:spcPts val="0"/>
-                        </a:spcAft>
-                        <a:buClr>
-                          <a:srgbClr val="000000"/>
-                        </a:buClr>
-                        <a:buSzPts val="1800"/>
-                        <a:buFont typeface="Arial"/>
-                        <a:buNone/>
-                      </a:pPr>
-                      <a:r>
-                        <a:rPr lang="en-US" sz="1800" u="none" strike="noStrike" cap="none"/>
-                        <a:t>~4,000</a:t>
-                      </a:r>
-                      <a:endParaRPr sz="1400" u="none" strike="noStrike" cap="none"/>
-                    </a:p>
-                  </a:txBody>
-                  <a:tcPr marL="91450" marR="91450" marT="45725" marB="45725"/>
-                </a:tc>
-                <a:extLst>
-                  <a:ext uri="{0D108BD9-81ED-4DB2-BD59-A6C34878D82A}">
-                    <a16:rowId xmlns:a16="http://schemas.microsoft.com/office/drawing/2014/main" val="10002"/>
-                  </a:ext>
-                </a:extLst>
-              </a:tr>
-              <a:tr h="370850">
-                <a:tc>
-                  <a:txBody>
-                    <a:bodyPr/>
-                    <a:lstStyle/>
-                    <a:p>
-                      <a:pPr marL="0" marR="0" lvl="0" indent="0" algn="l" rtl="0">
-                        <a:lnSpc>
-                          <a:spcPct val="100000"/>
-                        </a:lnSpc>
-                        <a:spcBef>
-                          <a:spcPts val="0"/>
-                        </a:spcBef>
-                        <a:spcAft>
-                          <a:spcPts val="0"/>
-                        </a:spcAft>
-                        <a:buClr>
-                          <a:srgbClr val="000000"/>
-                        </a:buClr>
-                        <a:buSzPts val="1800"/>
-                        <a:buFont typeface="Arial"/>
-                        <a:buNone/>
-                      </a:pPr>
-                      <a:r>
-                        <a:rPr lang="en-US" sz="1800" u="none" strike="noStrike" cap="none"/>
-                        <a:t>TOTAL</a:t>
-                      </a:r>
-                      <a:endParaRPr sz="1400" u="none" strike="noStrike" cap="none"/>
-                    </a:p>
-                  </a:txBody>
-                  <a:tcPr marL="91450" marR="91450" marT="45725" marB="45725"/>
-                </a:tc>
-                <a:tc>
-                  <a:txBody>
-                    <a:bodyPr/>
-                    <a:lstStyle/>
-                    <a:p>
-                      <a:pPr marL="0" marR="0" lvl="0" indent="0" algn="r" rtl="0">
-                        <a:lnSpc>
-                          <a:spcPct val="100000"/>
-                        </a:lnSpc>
-                        <a:spcBef>
-                          <a:spcPts val="0"/>
-                        </a:spcBef>
-                        <a:spcAft>
-                          <a:spcPts val="0"/>
-                        </a:spcAft>
-                        <a:buClr>
-                          <a:srgbClr val="000000"/>
-                        </a:buClr>
-                        <a:buSzPts val="1800"/>
-                        <a:buFont typeface="Arial"/>
-                        <a:buNone/>
-                      </a:pPr>
-                      <a:r>
-                        <a:rPr lang="en-US" sz="1800" u="none" strike="noStrike" cap="none"/>
-                        <a:t>59</a:t>
-                      </a:r>
-                      <a:endParaRPr sz="1400" u="none" strike="noStrike" cap="none"/>
-                    </a:p>
-                  </a:txBody>
-                  <a:tcPr marL="91450" marR="91450" marT="45725" marB="45725"/>
-                </a:tc>
-                <a:tc>
-                  <a:txBody>
-                    <a:bodyPr/>
-                    <a:lstStyle/>
-                    <a:p>
-                      <a:pPr marL="0" marR="0" lvl="0" indent="0" algn="r" rtl="0">
-                        <a:lnSpc>
-                          <a:spcPct val="100000"/>
-                        </a:lnSpc>
-                        <a:spcBef>
-                          <a:spcPts val="0"/>
-                        </a:spcBef>
-                        <a:spcAft>
-                          <a:spcPts val="0"/>
-                        </a:spcAft>
-                        <a:buClr>
-                          <a:srgbClr val="000000"/>
-                        </a:buClr>
-                        <a:buSzPts val="1800"/>
-                        <a:buFont typeface="Arial"/>
-                        <a:buNone/>
-                      </a:pPr>
-                      <a:r>
-                        <a:rPr lang="en-US" sz="1800" u="none" strike="noStrike" cap="none"/>
-                        <a:t>~10,000</a:t>
-                      </a:r>
-                      <a:endParaRPr sz="1400" u="none" strike="noStrike" cap="none"/>
-                    </a:p>
-                  </a:txBody>
-                  <a:tcPr marL="91450" marR="91450" marT="45725" marB="45725"/>
-                </a:tc>
-                <a:extLst>
-                  <a:ext uri="{0D108BD9-81ED-4DB2-BD59-A6C34878D82A}">
-                    <a16:rowId xmlns:a16="http://schemas.microsoft.com/office/drawing/2014/main" val="10003"/>
-                  </a:ext>
-                </a:extLst>
-              </a:tr>
-            </a:tbl>
-          </a:graphicData>
-        </a:graphic>
-      </p:graphicFrame>
-      <p:pic>
-        <p:nvPicPr>
-          <p:cNvPr id="125" name="Google Shape;125;p3" descr="Diagram&#10;&#10;Description automatically generated"/>
-          <p:cNvPicPr preferRelativeResize="0"/>
-          <p:nvPr/>
-        </p:nvPicPr>
-        <p:blipFill rotWithShape="1">
-          <a:blip r:embed="rId3">
-            <a:alphaModFix/>
-          </a:blip>
-          <a:srcRect/>
-          <a:stretch/>
-        </p:blipFill>
-        <p:spPr>
-          <a:xfrm rot="-5400000">
-            <a:off x="2753134" y="-9909"/>
-            <a:ext cx="3392399" cy="8404891"/>
-          </a:xfrm>
-          <a:prstGeom prst="rect">
-            <a:avLst/>
-          </a:prstGeom>
-          <a:noFill/>
-          <a:ln>
-            <a:noFill/>
-          </a:ln>
-        </p:spPr>
-      </p:pic>
-      <p:sp>
-        <p:nvSpPr>
-          <p:cNvPr id="126" name="Google Shape;126;p3"/>
-          <p:cNvSpPr txBox="1"/>
-          <p:nvPr/>
-        </p:nvSpPr>
-        <p:spPr>
-          <a:xfrm>
-            <a:off x="6236603" y="1944123"/>
-            <a:ext cx="2528400" cy="646200"/>
-          </a:xfrm>
-          <a:prstGeom prst="rect">
-            <a:avLst/>
-          </a:prstGeom>
-          <a:solidFill>
-            <a:schemeClr val="lt1"/>
-          </a:solidFill>
-          <a:ln>
-            <a:noFill/>
-          </a:ln>
-        </p:spPr>
-        <p:txBody>
-          <a:bodyPr spcFirstLastPara="1" wrap="square" lIns="91425" tIns="45700" rIns="91425" bIns="45700" anchor="t" anchorCtr="0">
+          <a:bodyPr wrap="square">
             <a:spAutoFit/>
           </a:bodyPr>
           <a:lstStyle/>
           <a:p>
-            <a:pPr marL="0" marR="0" lvl="0" indent="0" algn="l" rtl="0">
-              <a:lnSpc>
-                <a:spcPct val="100000"/>
-              </a:lnSpc>
-              <a:spcBef>
-                <a:spcPts val="0"/>
-              </a:spcBef>
-              <a:spcAft>
-                <a:spcPts val="0"/>
-              </a:spcAft>
-              <a:buClr>
-                <a:srgbClr val="000000"/>
-              </a:buClr>
-              <a:buSzPts val="1800"/>
-              <a:buFont typeface="Arial"/>
-              <a:buNone/>
-            </a:pPr>
             <a:r>
-              <a:rPr lang="en-US" sz="1800" b="0" i="0" u="none" strike="noStrike" cap="none">
-                <a:solidFill>
-                  <a:schemeClr val="dk1"/>
-                </a:solidFill>
-                <a:latin typeface="Arial"/>
-                <a:ea typeface="Arial"/>
-                <a:cs typeface="Arial"/>
-                <a:sym typeface="Arial"/>
-              </a:rPr>
-              <a:t>Call graph for module</a:t>
+              <a:rPr lang="en-US" dirty="0"/>
+              <a:t>https://sys-</a:t>
             </a:r>
-            <a:endParaRPr sz="1400" b="0" i="0" u="none" strike="noStrike" cap="none">
-              <a:solidFill>
-                <a:srgbClr val="000000"/>
-              </a:solidFill>
-              <a:latin typeface="Arial"/>
-              <a:ea typeface="Arial"/>
-              <a:cs typeface="Arial"/>
-              <a:sym typeface="Arial"/>
-            </a:endParaRPr>
-          </a:p>
-          <a:p>
-            <a:pPr marL="0" marR="0" lvl="0" indent="0" algn="l" rtl="0">
-              <a:lnSpc>
-                <a:spcPct val="100000"/>
-              </a:lnSpc>
-              <a:spcBef>
-                <a:spcPts val="0"/>
-              </a:spcBef>
-              <a:spcAft>
-                <a:spcPts val="0"/>
-              </a:spcAft>
-              <a:buClr>
-                <a:srgbClr val="000000"/>
-              </a:buClr>
-              <a:buSzPts val="1800"/>
-              <a:buFont typeface="Arial"/>
-              <a:buNone/>
-            </a:pPr>
             <a:r>
-              <a:rPr lang="en-US" sz="1800" b="0" i="0" u="none" strike="noStrike" cap="none">
-                <a:solidFill>
-                  <a:schemeClr val="dk1"/>
-                </a:solidFill>
-                <a:latin typeface="Courier New"/>
-                <a:ea typeface="Courier New"/>
-                <a:cs typeface="Courier New"/>
-                <a:sym typeface="Courier New"/>
-              </a:rPr>
-              <a:t>timeseriesPlotter</a:t>
+              <a:rPr lang="en-US" dirty="0" err="1"/>
+              <a:t>bio.github.io</a:t>
             </a:r>
-            <a:endParaRPr sz="1800" b="0" i="0" u="none" strike="noStrike" cap="none">
-              <a:solidFill>
-                <a:schemeClr val="dk1"/>
-              </a:solidFill>
-              <a:latin typeface="Courier New"/>
-              <a:ea typeface="Courier New"/>
-              <a:cs typeface="Courier New"/>
-              <a:sym typeface="Courier New"/>
-            </a:endParaRPr>
+            <a:r>
+              <a:rPr lang="en-US" dirty="0"/>
+              <a:t>/</a:t>
+            </a:r>
+            <a:r>
+              <a:rPr lang="en-US" dirty="0" err="1"/>
+              <a:t>AntimonyEditor</a:t>
+            </a:r>
+            <a:r>
+              <a:rPr lang="en-US" dirty="0"/>
+              <a:t>/</a:t>
+            </a:r>
           </a:p>
         </p:txBody>
       </p:sp>
     </p:spTree>
+    <p:extLst>
+      <p:ext uri="{BB962C8B-B14F-4D97-AF65-F5344CB8AC3E}">
+        <p14:creationId xmlns:p14="http://schemas.microsoft.com/office/powerpoint/2010/main" val="180131675"/>
+      </p:ext>
+    </p:extLst>
   </p:cSld>
   <p:clrMapOvr>
     <a:masterClrMapping/>
   </p:clrMapOvr>
-  <p:timing>
-    <p:tnLst>
-      <p:par>
-        <p:cTn id="1" dur="indefinite" restart="never" nodeType="tmRoot">
-          <p:childTnLst>
-            <p:seq concurrent="1" nextAc="seek">
-              <p:cTn id="2" dur="indefinite" nodeType="mainSeq">
-                <p:childTnLst>
-                  <p:par>
-                    <p:cTn id="3" fill="hold">
-                      <p:stCondLst>
-                        <p:cond delay="indefinite"/>
-                      </p:stCondLst>
-                      <p:childTnLst>
-                        <p:par>
-                          <p:cTn id="4" fill="hold">
-                            <p:stCondLst>
-                              <p:cond delay="0"/>
-                            </p:stCondLst>
-                            <p:childTnLst>
-                              <p:par>
-                                <p:cTn id="5" presetID="1" presetClass="entr" presetSubtype="0" fill="hold" nodeType="clickEffect">
-                                  <p:stCondLst>
-                                    <p:cond delay="0"/>
-                                  </p:stCondLst>
-                                  <p:childTnLst>
-                                    <p:set>
-                                      <p:cBhvr>
-                                        <p:cTn id="6" dur="1" fill="hold">
-                                          <p:stCondLst>
-                                            <p:cond delay="0"/>
-                                          </p:stCondLst>
-                                        </p:cTn>
-                                        <p:tgtEl>
-                                          <p:spTgt spid="124"/>
-                                        </p:tgtEl>
-                                        <p:attrNameLst>
-                                          <p:attrName>style.visibility</p:attrName>
-                                        </p:attrNameLst>
-                                      </p:cBhvr>
-                                      <p:to>
-                                        <p:strVal val="visible"/>
-                                      </p:to>
-                                    </p:set>
-                                  </p:childTnLst>
-                                </p:cTn>
-                              </p:par>
-                            </p:childTnLst>
-                          </p:cTn>
-                        </p:par>
-                      </p:childTnLst>
-                    </p:cTn>
-                  </p:par>
-                  <p:par>
-                    <p:cTn id="7" fill="hold">
-                      <p:stCondLst>
-                        <p:cond delay="indefinite"/>
-                      </p:stCondLst>
-                      <p:childTnLst>
-                        <p:par>
-                          <p:cTn id="8" fill="hold">
-                            <p:stCondLst>
-                              <p:cond delay="0"/>
-                            </p:stCondLst>
-                            <p:childTnLst>
-                              <p:par>
-                                <p:cTn id="9" presetID="1" presetClass="entr" presetSubtype="0" fill="hold" nodeType="clickEffect">
-                                  <p:stCondLst>
-                                    <p:cond delay="0"/>
-                                  </p:stCondLst>
-                                  <p:childTnLst>
-                                    <p:set>
-                                      <p:cBhvr>
-                                        <p:cTn id="10" dur="1" fill="hold">
-                                          <p:stCondLst>
-                                            <p:cond delay="0"/>
-                                          </p:stCondLst>
-                                        </p:cTn>
-                                        <p:tgtEl>
-                                          <p:spTgt spid="126"/>
-                                        </p:tgtEl>
-                                        <p:attrNameLst>
-                                          <p:attrName>style.visibility</p:attrName>
-                                        </p:attrNameLst>
-                                      </p:cBhvr>
-                                      <p:to>
-                                        <p:strVal val="visible"/>
-                                      </p:to>
-                                    </p:set>
-                                  </p:childTnLst>
-                                </p:cTn>
-                              </p:par>
-                              <p:par>
-                                <p:cTn id="11" presetID="1" presetClass="entr" presetSubtype="0" fill="hold" nodeType="withEffect">
-                                  <p:stCondLst>
-                                    <p:cond delay="0"/>
-                                  </p:stCondLst>
-                                  <p:childTnLst>
-                                    <p:set>
-                                      <p:cBhvr>
-                                        <p:cTn id="12" dur="1" fill="hold">
-                                          <p:stCondLst>
-                                            <p:cond delay="0"/>
-                                          </p:stCondLst>
-                                        </p:cTn>
-                                        <p:tgtEl>
-                                          <p:spTgt spid="125"/>
-                                        </p:tgtEl>
-                                        <p:attrNameLst>
-                                          <p:attrName>style.visibility</p:attrName>
-                                        </p:attrNameLst>
-                                      </p:cBhvr>
-                                      <p:to>
-                                        <p:strVal val="visible"/>
-                                      </p:to>
-                                    </p:set>
-                                  </p:childTnLst>
-                                </p:cTn>
-                              </p:par>
-                            </p:childTnLst>
-                          </p:cTn>
-                        </p:par>
-                      </p:childTnLst>
-                    </p:cTn>
-                  </p:par>
-                </p:childTnLst>
-              </p:cTn>
-              <p:prevCondLst>
-                <p:cond evt="onPrev" delay="0">
-                  <p:tgtEl>
-                    <p:sldTgt/>
-                  </p:tgtEl>
-                </p:cond>
-              </p:prevCondLst>
-              <p:nextCondLst>
-                <p:cond evt="onNext" delay="0">
-                  <p:tgtEl>
-                    <p:sldTgt/>
-                  </p:tgtEl>
-                </p:cond>
-              </p:nextCondLst>
-            </p:seq>
-          </p:childTnLst>
-        </p:cTn>
-      </p:par>
-    </p:tnLst>
-  </p:timing>
 </p:sld>
 </file>
 
-<file path=ppt/slides/slide4.xml><?xml version="1.0" encoding="utf-8"?>
+<file path=ppt/slides/slide3.xml><?xml version="1.0" encoding="utf-8"?>
 <p:sld xmlns:a="http://schemas.openxmlformats.org/drawingml/2006/main" xmlns:r="http://schemas.openxmlformats.org/officeDocument/2006/relationships" xmlns:p="http://schemas.openxmlformats.org/presentationml/2006/main">
   <p:cSld>
     <p:spTree>
@@ -34459,7 +33318,7 @@
             </a:pPr>
             <a:fld id="{00000000-1234-1234-1234-123412341234}" type="slidenum">
               <a:rPr lang="en-US"/>
-              <a:t>4</a:t>
+              <a:t>3</a:t>
             </a:fld>
             <a:endParaRPr/>
           </a:p>
@@ -34653,7 +33512,7 @@
 </p:sld>
 </file>
 
-<file path=ppt/slides/slide5.xml><?xml version="1.0" encoding="utf-8"?>
+<file path=ppt/slides/slide4.xml><?xml version="1.0" encoding="utf-8"?>
 <p:sld xmlns:a="http://schemas.openxmlformats.org/drawingml/2006/main" xmlns:r="http://schemas.openxmlformats.org/officeDocument/2006/relationships" xmlns:p="http://schemas.openxmlformats.org/presentationml/2006/main">
   <p:cSld>
     <p:spTree>
@@ -34817,7 +33676,7 @@
             </a:pPr>
             <a:fld id="{00000000-1234-1234-1234-123412341234}" type="slidenum">
               <a:rPr lang="en-US"/>
-              <a:t>5</a:t>
+              <a:t>4</a:t>
             </a:fld>
             <a:endParaRPr/>
           </a:p>
@@ -36413,7 +35272,7 @@
 </p:sld>
 </file>
 
-<file path=ppt/slides/slide6.xml><?xml version="1.0" encoding="utf-8"?>
+<file path=ppt/slides/slide5.xml><?xml version="1.0" encoding="utf-8"?>
 <p:sld xmlns:a="http://schemas.openxmlformats.org/drawingml/2006/main" xmlns:r="http://schemas.openxmlformats.org/officeDocument/2006/relationships" xmlns:p="http://schemas.openxmlformats.org/presentationml/2006/main">
   <p:cSld>
     <p:spTree>
@@ -36577,7 +35436,7 @@
             </a:pPr>
             <a:fld id="{00000000-1234-1234-1234-123412341234}" type="slidenum">
               <a:rPr lang="en-US"/>
-              <a:t>6</a:t>
+              <a:t>5</a:t>
             </a:fld>
             <a:endParaRPr/>
           </a:p>
@@ -37074,7 +35933,7 @@
 </p:sld>
 </file>
 
-<file path=ppt/slides/slide7.xml><?xml version="1.0" encoding="utf-8"?>
+<file path=ppt/slides/slide6.xml><?xml version="1.0" encoding="utf-8"?>
 <p:sld xmlns:a="http://schemas.openxmlformats.org/drawingml/2006/main" xmlns:r="http://schemas.openxmlformats.org/officeDocument/2006/relationships" xmlns:p="http://schemas.openxmlformats.org/presentationml/2006/main">
   <p:cSld>
     <p:spTree>
@@ -37185,7 +36044,7 @@
             </a:pPr>
             <a:fld id="{00000000-1234-1234-1234-123412341234}" type="slidenum">
               <a:rPr lang="en-US"/>
-              <a:t>7</a:t>
+              <a:t>6</a:t>
             </a:fld>
             <a:endParaRPr/>
           </a:p>
@@ -37199,7 +36058,7 @@
 </p:sld>
 </file>
 
-<file path=ppt/slides/slide8.xml><?xml version="1.0" encoding="utf-8"?>
+<file path=ppt/slides/slide7.xml><?xml version="1.0" encoding="utf-8"?>
 <p:sld xmlns:a="http://schemas.openxmlformats.org/drawingml/2006/main" xmlns:r="http://schemas.openxmlformats.org/officeDocument/2006/relationships" xmlns:p="http://schemas.openxmlformats.org/presentationml/2006/main">
   <p:cSld>
     <p:spTree>
@@ -37310,7 +36169,7 @@
             </a:pPr>
             <a:fld id="{00000000-1234-1234-1234-123412341234}" type="slidenum">
               <a:rPr lang="en-US"/>
-              <a:t>8</a:t>
+              <a:t>7</a:t>
             </a:fld>
             <a:endParaRPr/>
           </a:p>
@@ -37803,7 +36662,7 @@
 </p:sld>
 </file>
 
-<file path=ppt/slides/slide9.xml><?xml version="1.0" encoding="utf-8"?>
+<file path=ppt/slides/slide8.xml><?xml version="1.0" encoding="utf-8"?>
 <p:sld xmlns:a="http://schemas.openxmlformats.org/drawingml/2006/main" xmlns:r="http://schemas.openxmlformats.org/officeDocument/2006/relationships" xmlns:p="http://schemas.openxmlformats.org/presentationml/2006/main">
   <p:cSld>
     <p:spTree>
@@ -37914,7 +36773,7 @@
             </a:pPr>
             <a:fld id="{00000000-1234-1234-1234-123412341234}" type="slidenum">
               <a:rPr lang="en-US"/>
-              <a:t>9</a:t>
+              <a:t>8</a:t>
             </a:fld>
             <a:endParaRPr/>
           </a:p>
@@ -39450,6 +38309,349 @@
       </p:par>
     </p:tnLst>
   </p:timing>
+</p:sld>
+</file>
+
+<file path=ppt/slides/slide9.xml><?xml version="1.0" encoding="utf-8"?>
+<p:sld xmlns:a="http://schemas.openxmlformats.org/drawingml/2006/main" xmlns:r="http://schemas.openxmlformats.org/officeDocument/2006/relationships" xmlns:p="http://schemas.openxmlformats.org/presentationml/2006/main">
+  <p:cSld>
+    <p:spTree>
+      <p:nvGrpSpPr>
+        <p:cNvPr id="1" name="Shape 222"/>
+        <p:cNvGrpSpPr/>
+        <p:nvPr/>
+      </p:nvGrpSpPr>
+      <p:grpSpPr>
+        <a:xfrm>
+          <a:off x="0" y="0"/>
+          <a:ext cx="0" cy="0"/>
+          <a:chOff x="0" y="0"/>
+          <a:chExt cx="0" cy="0"/>
+        </a:xfrm>
+      </p:grpSpPr>
+      <p:sp>
+        <p:nvSpPr>
+          <p:cNvPr id="223" name="Google Shape;223;p11"/>
+          <p:cNvSpPr txBox="1">
+            <a:spLocks noGrp="1"/>
+          </p:cNvSpPr>
+          <p:nvPr>
+            <p:ph type="title"/>
+          </p:nvPr>
+        </p:nvSpPr>
+        <p:spPr>
+          <a:xfrm>
+            <a:off x="457200" y="381000"/>
+            <a:ext cx="8229600" cy="838200"/>
+          </a:xfrm>
+          <a:prstGeom prst="rect">
+            <a:avLst/>
+          </a:prstGeom>
+          <a:noFill/>
+          <a:ln>
+            <a:noFill/>
+          </a:ln>
+        </p:spPr>
+        <p:txBody>
+          <a:bodyPr spcFirstLastPara="1" wrap="square" lIns="91425" tIns="45700" rIns="91425" bIns="45700" anchor="t" anchorCtr="0">
+            <a:noAutofit/>
+          </a:bodyPr>
+          <a:lstStyle/>
+          <a:p>
+            <a:pPr marL="0" lvl="0" indent="0" algn="ctr" rtl="0">
+              <a:lnSpc>
+                <a:spcPct val="100000"/>
+              </a:lnSpc>
+              <a:spcBef>
+                <a:spcPts val="0"/>
+              </a:spcBef>
+              <a:spcAft>
+                <a:spcPts val="0"/>
+              </a:spcAft>
+              <a:buSzPts val="1400"/>
+              <a:buNone/>
+            </a:pPr>
+            <a:r>
+              <a:rPr lang="en-US"/>
+              <a:t>True Mass Balance May Not Be Desirable</a:t>
+            </a:r>
+            <a:endParaRPr/>
+          </a:p>
+        </p:txBody>
+      </p:sp>
+      <p:sp>
+        <p:nvSpPr>
+          <p:cNvPr id="224" name="Google Shape;224;p11"/>
+          <p:cNvSpPr txBox="1">
+            <a:spLocks noGrp="1"/>
+          </p:cNvSpPr>
+          <p:nvPr>
+            <p:ph type="body" idx="1"/>
+          </p:nvPr>
+        </p:nvSpPr>
+        <p:spPr>
+          <a:xfrm>
+            <a:off x="457200" y="2209799"/>
+            <a:ext cx="8229600" cy="2948941"/>
+          </a:xfrm>
+          <a:prstGeom prst="rect">
+            <a:avLst/>
+          </a:prstGeom>
+          <a:noFill/>
+          <a:ln>
+            <a:noFill/>
+          </a:ln>
+        </p:spPr>
+        <p:txBody>
+          <a:bodyPr spcFirstLastPara="1" wrap="square" lIns="91425" tIns="45700" rIns="91425" bIns="45700" anchor="t" anchorCtr="0">
+            <a:noAutofit/>
+          </a:bodyPr>
+          <a:lstStyle/>
+          <a:p>
+            <a:pPr marL="342900" lvl="0" indent="-342900" algn="l" rtl="0">
+              <a:lnSpc>
+                <a:spcPct val="100000"/>
+              </a:lnSpc>
+              <a:spcBef>
+                <a:spcPts val="0"/>
+              </a:spcBef>
+              <a:spcAft>
+                <a:spcPts val="0"/>
+              </a:spcAft>
+              <a:buClr>
+                <a:schemeClr val="dk1"/>
+              </a:buClr>
+              <a:buSzPts val="2400"/>
+              <a:buChar char="•"/>
+            </a:pPr>
+            <a:r>
+              <a:rPr lang="en-US"/>
+              <a:t>True mass balance precludes having implicit chemical species</a:t>
+            </a:r>
+            <a:endParaRPr/>
+          </a:p>
+          <a:p>
+            <a:pPr marL="742950" lvl="1" indent="-285750" algn="l" rtl="0">
+              <a:lnSpc>
+                <a:spcPct val="100000"/>
+              </a:lnSpc>
+              <a:spcBef>
+                <a:spcPts val="480"/>
+              </a:spcBef>
+              <a:spcAft>
+                <a:spcPts val="0"/>
+              </a:spcAft>
+              <a:buClr>
+                <a:schemeClr val="dk1"/>
+              </a:buClr>
+              <a:buSzPts val="2400"/>
+              <a:buChar char="–"/>
+            </a:pPr>
+            <a:r>
+              <a:rPr lang="en-US"/>
+              <a:t>Present in large quantities so that concentration does not change (e.g., water)</a:t>
+            </a:r>
+            <a:endParaRPr/>
+          </a:p>
+          <a:p>
+            <a:pPr marL="342900" lvl="0" indent="-342900" algn="l" rtl="0">
+              <a:lnSpc>
+                <a:spcPct val="100000"/>
+              </a:lnSpc>
+              <a:spcBef>
+                <a:spcPts val="480"/>
+              </a:spcBef>
+              <a:spcAft>
+                <a:spcPts val="0"/>
+              </a:spcAft>
+              <a:buClr>
+                <a:schemeClr val="dk1"/>
+              </a:buClr>
+              <a:buSzPts val="2400"/>
+              <a:buChar char="•"/>
+            </a:pPr>
+            <a:r>
+              <a:rPr lang="en-US"/>
+              <a:t>Appeal of implicit chemical species</a:t>
+            </a:r>
+            <a:endParaRPr/>
+          </a:p>
+          <a:p>
+            <a:pPr marL="742950" lvl="1" indent="-285750" algn="l" rtl="0">
+              <a:lnSpc>
+                <a:spcPct val="100000"/>
+              </a:lnSpc>
+              <a:spcBef>
+                <a:spcPts val="480"/>
+              </a:spcBef>
+              <a:spcAft>
+                <a:spcPts val="0"/>
+              </a:spcAft>
+              <a:buClr>
+                <a:schemeClr val="dk1"/>
+              </a:buClr>
+              <a:buSzPts val="2400"/>
+              <a:buChar char="–"/>
+            </a:pPr>
+            <a:r>
+              <a:rPr lang="en-US"/>
+              <a:t>Simpler reactions</a:t>
+            </a:r>
+            <a:endParaRPr/>
+          </a:p>
+          <a:p>
+            <a:pPr marL="742950" lvl="1" indent="-285750" algn="l" rtl="0">
+              <a:lnSpc>
+                <a:spcPct val="100000"/>
+              </a:lnSpc>
+              <a:spcBef>
+                <a:spcPts val="480"/>
+              </a:spcBef>
+              <a:spcAft>
+                <a:spcPts val="0"/>
+              </a:spcAft>
+              <a:buClr>
+                <a:schemeClr val="dk1"/>
+              </a:buClr>
+              <a:buSzPts val="2400"/>
+              <a:buChar char="–"/>
+            </a:pPr>
+            <a:r>
+              <a:rPr lang="en-US"/>
+              <a:t>More efficient simulation</a:t>
+            </a:r>
+            <a:endParaRPr/>
+          </a:p>
+        </p:txBody>
+      </p:sp>
+      <p:sp>
+        <p:nvSpPr>
+          <p:cNvPr id="225" name="Google Shape;225;p11"/>
+          <p:cNvSpPr txBox="1">
+            <a:spLocks noGrp="1"/>
+          </p:cNvSpPr>
+          <p:nvPr>
+            <p:ph type="sldNum" idx="12"/>
+          </p:nvPr>
+        </p:nvSpPr>
+        <p:spPr>
+          <a:xfrm>
+            <a:off x="7543801" y="6248400"/>
+            <a:ext cx="533400" cy="365125"/>
+          </a:xfrm>
+          <a:prstGeom prst="rect">
+            <a:avLst/>
+          </a:prstGeom>
+          <a:noFill/>
+          <a:ln>
+            <a:noFill/>
+          </a:ln>
+        </p:spPr>
+        <p:txBody>
+          <a:bodyPr spcFirstLastPara="1" wrap="square" lIns="91425" tIns="45700" rIns="91425" bIns="45700" anchor="t" anchorCtr="0">
+            <a:noAutofit/>
+          </a:bodyPr>
+          <a:lstStyle/>
+          <a:p>
+            <a:pPr marL="0" lvl="0" indent="0" algn="l" rtl="0">
+              <a:lnSpc>
+                <a:spcPct val="100000"/>
+              </a:lnSpc>
+              <a:spcBef>
+                <a:spcPts val="0"/>
+              </a:spcBef>
+              <a:spcAft>
+                <a:spcPts val="0"/>
+              </a:spcAft>
+              <a:buSzPts val="1800"/>
+              <a:buNone/>
+            </a:pPr>
+            <a:fld id="{00000000-1234-1234-1234-123412341234}" type="slidenum">
+              <a:rPr lang="en-US"/>
+              <a:t>9</a:t>
+            </a:fld>
+            <a:endParaRPr/>
+          </a:p>
+        </p:txBody>
+      </p:sp>
+      <p:sp>
+        <p:nvSpPr>
+          <p:cNvPr id="226" name="Google Shape;226;p11"/>
+          <p:cNvSpPr txBox="1"/>
+          <p:nvPr/>
+        </p:nvSpPr>
+        <p:spPr>
+          <a:xfrm>
+            <a:off x="2331653" y="1333142"/>
+            <a:ext cx="3841180" cy="430887"/>
+          </a:xfrm>
+          <a:prstGeom prst="rect">
+            <a:avLst/>
+          </a:prstGeom>
+          <a:blipFill rotWithShape="1">
+            <a:blip r:embed="rId3">
+              <a:alphaModFix/>
+            </a:blip>
+            <a:stretch>
+              <a:fillRect b="-17641"/>
+            </a:stretch>
+          </a:blipFill>
+          <a:ln>
+            <a:noFill/>
+          </a:ln>
+        </p:spPr>
+        <p:txBody>
+          <a:bodyPr spcFirstLastPara="1" wrap="square" lIns="91425" tIns="45700" rIns="91425" bIns="45700" anchor="t" anchorCtr="0">
+            <a:noAutofit/>
+          </a:bodyPr>
+          <a:lstStyle/>
+          <a:p>
+            <a:pPr marL="0" marR="0" lvl="0" indent="0" algn="l" rtl="0">
+              <a:lnSpc>
+                <a:spcPct val="100000"/>
+              </a:lnSpc>
+              <a:spcBef>
+                <a:spcPts val="0"/>
+              </a:spcBef>
+              <a:spcAft>
+                <a:spcPts val="0"/>
+              </a:spcAft>
+              <a:buClr>
+                <a:srgbClr val="000000"/>
+              </a:buClr>
+              <a:buSzPts val="1800"/>
+              <a:buFont typeface="Arial"/>
+              <a:buNone/>
+            </a:pPr>
+            <a:r>
+              <a:rPr lang="en-US" sz="1800" b="0" i="0" u="none" strike="noStrike" cap="none">
+                <a:solidFill>
+                  <a:srgbClr val="000000"/>
+                </a:solidFill>
+                <a:latin typeface="Arial"/>
+                <a:ea typeface="Arial"/>
+                <a:cs typeface="Arial"/>
+                <a:sym typeface="Arial"/>
+              </a:rPr>
+              <a:t> </a:t>
+            </a:r>
+            <a:endParaRPr sz="1400" b="0" i="0" u="none" strike="noStrike" cap="none">
+              <a:solidFill>
+                <a:srgbClr val="000000"/>
+              </a:solidFill>
+              <a:latin typeface="Arial"/>
+              <a:ea typeface="Arial"/>
+              <a:cs typeface="Arial"/>
+              <a:sym typeface="Arial"/>
+            </a:endParaRPr>
+          </a:p>
+        </p:txBody>
+      </p:sp>
+    </p:spTree>
+  </p:cSld>
+  <p:clrMapOvr>
+    <a:masterClrMapping/>
+  </p:clrMapOvr>
 </p:sld>
 </file>
 

</xml_diff>